<commit_message>
address feedback comments in the presentation
</commit_message>
<xml_diff>
--- a/evermal_MTD2015_2.pptx
+++ b/evermal_MTD2015_2.pptx
@@ -5,7 +5,7 @@
     <p:sldMasterId id="2147483648" r:id="rId1"/>
   </p:sldMasterIdLst>
   <p:notesMasterIdLst>
-    <p:notesMasterId r:id="rId10"/>
+    <p:notesMasterId r:id="rId11"/>
   </p:notesMasterIdLst>
   <p:sldIdLst>
     <p:sldId id="259" r:id="rId2"/>
@@ -15,7 +15,8 @@
     <p:sldId id="262" r:id="rId6"/>
     <p:sldId id="263" r:id="rId7"/>
     <p:sldId id="264" r:id="rId8"/>
-    <p:sldId id="266" r:id="rId9"/>
+    <p:sldId id="267" r:id="rId9"/>
+    <p:sldId id="266" r:id="rId10"/>
   </p:sldIdLst>
   <p:sldSz cx="9144000" cy="6858000" type="screen4x3"/>
   <p:notesSz cx="6858000" cy="9144000"/>
@@ -1211,6 +1212,90 @@
             <a:fld id="{E6ED7E99-8F0C-4C27-A997-5B1A3AD8947C}" type="slidenum">
               <a:rPr lang="en-US" smtClean="0"/>
               <a:t>8</a:t>
+            </a:fld>
+            <a:endParaRPr lang="en-US"/>
+          </a:p>
+        </p:txBody>
+      </p:sp>
+    </p:spTree>
+    <p:extLst>
+      <p:ext uri="{BB962C8B-B14F-4D97-AF65-F5344CB8AC3E}">
+        <p14:creationId xmlns:p14="http://schemas.microsoft.com/office/powerpoint/2010/main" val="1912563071"/>
+      </p:ext>
+    </p:extLst>
+  </p:cSld>
+  <p:clrMapOvr>
+    <a:masterClrMapping/>
+  </p:clrMapOvr>
+</p:notes>
+</file>
+
+<file path=ppt/notesSlides/notesSlide9.xml><?xml version="1.0" encoding="utf-8"?>
+<p:notes xmlns:a="http://schemas.openxmlformats.org/drawingml/2006/main" xmlns:r="http://schemas.openxmlformats.org/officeDocument/2006/relationships" xmlns:p="http://schemas.openxmlformats.org/presentationml/2006/main">
+  <p:cSld>
+    <p:spTree>
+      <p:nvGrpSpPr>
+        <p:cNvPr id="1" name=""/>
+        <p:cNvGrpSpPr/>
+        <p:nvPr/>
+      </p:nvGrpSpPr>
+      <p:grpSpPr>
+        <a:xfrm>
+          <a:off x="0" y="0"/>
+          <a:ext cx="0" cy="0"/>
+          <a:chOff x="0" y="0"/>
+          <a:chExt cx="0" cy="0"/>
+        </a:xfrm>
+      </p:grpSpPr>
+      <p:sp>
+        <p:nvSpPr>
+          <p:cNvPr id="2" name="Slide Image Placeholder 1"/>
+          <p:cNvSpPr>
+            <a:spLocks noGrp="1" noRot="1" noChangeAspect="1"/>
+          </p:cNvSpPr>
+          <p:nvPr>
+            <p:ph type="sldImg"/>
+          </p:nvPr>
+        </p:nvSpPr>
+        <p:spPr/>
+      </p:sp>
+      <p:sp>
+        <p:nvSpPr>
+          <p:cNvPr id="3" name="Notes Placeholder 2"/>
+          <p:cNvSpPr>
+            <a:spLocks noGrp="1"/>
+          </p:cNvSpPr>
+          <p:nvPr>
+            <p:ph type="body" idx="1"/>
+          </p:nvPr>
+        </p:nvSpPr>
+        <p:spPr/>
+        <p:txBody>
+          <a:bodyPr/>
+          <a:lstStyle/>
+          <a:p>
+            <a:endParaRPr lang="en-US" dirty="0"/>
+          </a:p>
+        </p:txBody>
+      </p:sp>
+      <p:sp>
+        <p:nvSpPr>
+          <p:cNvPr id="4" name="Slide Number Placeholder 3"/>
+          <p:cNvSpPr>
+            <a:spLocks noGrp="1"/>
+          </p:cNvSpPr>
+          <p:nvPr>
+            <p:ph type="sldNum" sz="quarter" idx="10"/>
+          </p:nvPr>
+        </p:nvSpPr>
+        <p:spPr/>
+        <p:txBody>
+          <a:bodyPr/>
+          <a:lstStyle/>
+          <a:p>
+            <a:fld id="{E6ED7E99-8F0C-4C27-A997-5B1A3AD8947C}" type="slidenum">
+              <a:rPr lang="en-US" smtClean="0"/>
+              <a:t>9</a:t>
             </a:fld>
             <a:endParaRPr lang="en-US"/>
           </a:p>
@@ -4252,7 +4337,7 @@
       </p:sp>
       <p:pic>
         <p:nvPicPr>
-          <p:cNvPr id="5" name="Picture 4" descr="130951-748x642r1-Collection-of-goldfish-types.jpg"/>
+          <p:cNvPr id="2" name="Picture 1" descr="logo-encs.jpg"/>
           <p:cNvPicPr>
             <a:picLocks noChangeAspect="1"/>
           </p:cNvPicPr>
@@ -4260,36 +4345,6 @@
         </p:nvPicPr>
         <p:blipFill>
           <a:blip r:embed="rId3">
-            <a:extLst>
-              <a:ext uri="{28A0092B-C50C-407E-A947-70E740481C1C}">
-                <a14:useLocalDpi xmlns:a14="http://schemas.microsoft.com/office/drawing/2010/main" val="0"/>
-              </a:ext>
-            </a:extLst>
-          </a:blip>
-          <a:stretch>
-            <a:fillRect/>
-          </a:stretch>
-        </p:blipFill>
-        <p:spPr>
-          <a:xfrm>
-            <a:off x="76200" y="2536197"/>
-            <a:ext cx="4800600" cy="4120301"/>
-          </a:xfrm>
-          <a:prstGeom prst="rect">
-            <a:avLst/>
-          </a:prstGeom>
-        </p:spPr>
-      </p:pic>
-      <p:pic>
-        <p:nvPicPr>
-          <p:cNvPr id="2" name="Picture 1" descr="logo-encs.jpg"/>
-          <p:cNvPicPr>
-            <a:picLocks noChangeAspect="1"/>
-          </p:cNvPicPr>
-          <p:nvPr/>
-        </p:nvPicPr>
-        <p:blipFill>
-          <a:blip r:embed="rId4">
             <a:extLst>
               <a:ext uri="{28A0092B-C50C-407E-A947-70E740481C1C}">
                 <a14:useLocalDpi xmlns:a14="http://schemas.microsoft.com/office/drawing/2010/main" val="0"/>
@@ -4514,6 +4569,36 @@
           </a:p>
         </p:txBody>
       </p:sp>
+      <p:pic>
+        <p:nvPicPr>
+          <p:cNvPr id="3" name="Picture 2" descr="character-and-magnifying-glass.jpg"/>
+          <p:cNvPicPr>
+            <a:picLocks noChangeAspect="1"/>
+          </p:cNvPicPr>
+          <p:nvPr/>
+        </p:nvPicPr>
+        <p:blipFill>
+          <a:blip r:embed="rId4">
+            <a:extLst>
+              <a:ext uri="{28A0092B-C50C-407E-A947-70E740481C1C}">
+                <a14:useLocalDpi xmlns:a14="http://schemas.microsoft.com/office/drawing/2010/main" val="0"/>
+              </a:ext>
+            </a:extLst>
+          </a:blip>
+          <a:stretch>
+            <a:fillRect/>
+          </a:stretch>
+        </p:blipFill>
+        <p:spPr>
+          <a:xfrm>
+            <a:off x="592446" y="2468910"/>
+            <a:ext cx="3750954" cy="3654776"/>
+          </a:xfrm>
+          <a:prstGeom prst="rect">
+            <a:avLst/>
+          </a:prstGeom>
+        </p:spPr>
+      </p:pic>
     </p:spTree>
     <p:extLst>
       <p:ext uri="{BB962C8B-B14F-4D97-AF65-F5344CB8AC3E}">
@@ -4619,7 +4704,6 @@
               <a:rPr lang="en-US" sz="3600" dirty="0" smtClean="0"/>
               <a:t> deadlines</a:t>
             </a:r>
-            <a:endParaRPr lang="en-US" sz="2800" dirty="0" smtClean="0"/>
           </a:p>
         </p:txBody>
       </p:sp>
@@ -4710,7 +4794,6 @@
               <a:rPr lang="en-US" sz="3600" dirty="0" smtClean="0"/>
               <a:t> of knowledge</a:t>
             </a:r>
-            <a:endParaRPr lang="en-US" sz="2800" dirty="0" smtClean="0"/>
           </a:p>
         </p:txBody>
       </p:sp>
@@ -4722,7 +4805,7 @@
         </p:nvSpPr>
         <p:spPr>
           <a:xfrm>
-            <a:off x="2362200" y="4084454"/>
+            <a:off x="2362200" y="3924648"/>
             <a:ext cx="5638800" cy="646331"/>
           </a:xfrm>
           <a:prstGeom prst="rect">
@@ -4744,37 +4827,6 @@
               <a:rPr lang="en-US" sz="3600" b="1" dirty="0" smtClean="0"/>
               <a:t>Technical Debt</a:t>
             </a:r>
-            <a:endParaRPr lang="en-US" sz="2800" b="1" dirty="0" smtClean="0"/>
-          </a:p>
-        </p:txBody>
-      </p:sp>
-      <p:sp>
-        <p:nvSpPr>
-          <p:cNvPr id="18" name="TextBox 17"/>
-          <p:cNvSpPr txBox="1"/>
-          <p:nvPr/>
-        </p:nvSpPr>
-        <p:spPr>
-          <a:xfrm>
-            <a:off x="1210208" y="2796108"/>
-            <a:ext cx="6629400" cy="584776"/>
-          </a:xfrm>
-          <a:prstGeom prst="rect">
-            <a:avLst/>
-          </a:prstGeom>
-          <a:noFill/>
-        </p:spPr>
-        <p:txBody>
-          <a:bodyPr wrap="square" rtlCol="0">
-            <a:spAutoFit/>
-          </a:bodyPr>
-          <a:lstStyle/>
-          <a:p>
-            <a:endParaRPr lang="en-US" sz="3200" b="1" dirty="0">
-              <a:solidFill>
-                <a:schemeClr val="bg1"/>
-              </a:solidFill>
-            </a:endParaRPr>
           </a:p>
         </p:txBody>
       </p:sp>
@@ -4786,7 +4838,7 @@
         </p:nvGrpSpPr>
         <p:grpSpPr>
           <a:xfrm>
-            <a:off x="928601" y="2785969"/>
+            <a:off x="928601" y="2629248"/>
             <a:ext cx="8112553" cy="1295400"/>
             <a:chOff x="838200" y="4724400"/>
             <a:chExt cx="8112553" cy="1295400"/>
@@ -4851,7 +4903,7 @@
           <p:spPr>
             <a:xfrm>
               <a:off x="1572183" y="4969662"/>
-              <a:ext cx="7378570" cy="584776"/>
+              <a:ext cx="7378570" cy="646331"/>
             </a:xfrm>
             <a:prstGeom prst="rect">
               <a:avLst/>
@@ -4872,12 +4924,20 @@
             <a:lstStyle/>
             <a:p>
               <a:r>
+                <a:rPr lang="en-US" sz="3600" b="1" dirty="0" smtClean="0">
+                  <a:solidFill>
+                    <a:schemeClr val="bg1"/>
+                  </a:solidFill>
+                </a:rPr>
+                <a:t>Identification of technical debt</a:t>
+              </a:r>
+              <a:r>
                 <a:rPr lang="en-US" sz="3200" b="1" dirty="0" smtClean="0">
                   <a:solidFill>
                     <a:schemeClr val="bg1"/>
                   </a:solidFill>
                 </a:rPr>
-                <a:t>Identification of technical debt.  </a:t>
+                <a:t>  </a:t>
               </a:r>
               <a:endParaRPr lang="en-US" sz="3200" b="1" dirty="0">
                 <a:solidFill>
@@ -5271,8 +5331,8 @@
         </p:nvSpPr>
         <p:spPr>
           <a:xfrm>
-            <a:off x="1697652" y="2017759"/>
-            <a:ext cx="1981200" cy="461665"/>
+            <a:off x="1697651" y="1714963"/>
+            <a:ext cx="2667247" cy="584776"/>
           </a:xfrm>
           <a:prstGeom prst="rect">
             <a:avLst/>
@@ -5286,10 +5346,10 @@
           <a:lstStyle/>
           <a:p>
             <a:r>
-              <a:rPr lang="en-US" sz="2400" dirty="0" smtClean="0"/>
+              <a:rPr lang="en-US" sz="3200" dirty="0" smtClean="0"/>
               <a:t>More recently</a:t>
             </a:r>
-            <a:endParaRPr lang="en-US" sz="2400" dirty="0"/>
+            <a:endParaRPr lang="en-US" sz="3200" dirty="0"/>
           </a:p>
         </p:txBody>
       </p:sp>
@@ -5301,8 +5361,8 @@
         </p:nvSpPr>
         <p:spPr>
           <a:xfrm>
-            <a:off x="2728542" y="2466087"/>
-            <a:ext cx="2630848" cy="523220"/>
+            <a:off x="2728542" y="2163291"/>
+            <a:ext cx="3329758" cy="646331"/>
           </a:xfrm>
           <a:prstGeom prst="rect">
             <a:avLst/>
@@ -5316,10 +5376,10 @@
           <a:lstStyle/>
           <a:p>
             <a:r>
-              <a:rPr lang="en-US" sz="2800" b="1" dirty="0" smtClean="0"/>
+              <a:rPr lang="en-US" sz="3600" b="1" dirty="0" smtClean="0"/>
               <a:t>Code Comments</a:t>
             </a:r>
-            <a:endParaRPr lang="en-US" b="1" dirty="0"/>
+            <a:endParaRPr lang="en-US" sz="3600" b="1" dirty="0"/>
           </a:p>
         </p:txBody>
       </p:sp>
@@ -5359,8 +5419,8 @@
         </p:nvSpPr>
         <p:spPr>
           <a:xfrm>
-            <a:off x="2768732" y="3109611"/>
-            <a:ext cx="2534468" cy="461665"/>
+            <a:off x="2768732" y="2806815"/>
+            <a:ext cx="3317735" cy="584776"/>
           </a:xfrm>
           <a:prstGeom prst="rect">
             <a:avLst/>
@@ -5374,10 +5434,10 @@
           <a:lstStyle/>
           <a:p>
             <a:r>
-              <a:rPr lang="en-US" sz="2400" dirty="0" smtClean="0"/>
+              <a:rPr lang="en-US" sz="3200" dirty="0" smtClean="0"/>
               <a:t>Comment Patterns</a:t>
             </a:r>
-            <a:endParaRPr lang="en-US" sz="2400" dirty="0"/>
+            <a:endParaRPr lang="en-US" sz="3200" dirty="0"/>
           </a:p>
         </p:txBody>
       </p:sp>
@@ -5389,8 +5449,8 @@
         </p:nvSpPr>
         <p:spPr>
           <a:xfrm>
-            <a:off x="2728542" y="3934229"/>
-            <a:ext cx="2388156" cy="461665"/>
+            <a:off x="2728542" y="3631433"/>
+            <a:ext cx="3130722" cy="584776"/>
           </a:xfrm>
           <a:prstGeom prst="rect">
             <a:avLst/>
@@ -5404,30 +5464,30 @@
           <a:lstStyle/>
           <a:p>
             <a:r>
-              <a:rPr lang="en-US" sz="2400" i="1" dirty="0" smtClean="0"/>
+              <a:rPr lang="en-US" sz="3200" i="1" dirty="0" smtClean="0"/>
               <a:t>“</a:t>
             </a:r>
             <a:r>
-              <a:rPr lang="en-US" sz="2400" i="1" dirty="0" smtClean="0"/>
+              <a:rPr lang="en-US" sz="3200" i="1" dirty="0" smtClean="0"/>
               <a:t>probably </a:t>
             </a:r>
             <a:r>
-              <a:rPr lang="en-US" sz="2400" i="1" dirty="0"/>
+              <a:rPr lang="en-US" sz="3200" i="1" dirty="0"/>
               <a:t>a </a:t>
             </a:r>
             <a:r>
-              <a:rPr lang="en-US" sz="2400" i="1" dirty="0" smtClean="0"/>
+              <a:rPr lang="en-US" sz="3200" i="1" dirty="0" smtClean="0"/>
               <a:t>bug</a:t>
             </a:r>
             <a:r>
-              <a:rPr lang="en-US" sz="2400" i="1" dirty="0" smtClean="0"/>
+              <a:rPr lang="en-US" sz="3200" i="1" dirty="0" smtClean="0"/>
               <a:t>”</a:t>
             </a:r>
             <a:r>
-              <a:rPr lang="en-US" sz="2400" i="1" dirty="0" smtClean="0"/>
+              <a:rPr lang="en-US" sz="3200" i="1" dirty="0" smtClean="0"/>
               <a:t> </a:t>
             </a:r>
-            <a:endParaRPr lang="en-US" sz="2400" dirty="0"/>
+            <a:endParaRPr lang="en-US" sz="3200" dirty="0"/>
           </a:p>
         </p:txBody>
       </p:sp>
@@ -5439,8 +5499,8 @@
         </p:nvSpPr>
         <p:spPr>
           <a:xfrm>
-            <a:off x="2768732" y="3553622"/>
-            <a:ext cx="1021433" cy="461665"/>
+            <a:off x="2768732" y="3250826"/>
+            <a:ext cx="1307369" cy="584776"/>
           </a:xfrm>
           <a:prstGeom prst="rect">
             <a:avLst/>
@@ -5454,18 +5514,18 @@
           <a:lstStyle/>
           <a:p>
             <a:r>
-              <a:rPr lang="en-US" sz="2400" dirty="0" smtClean="0"/>
+              <a:rPr lang="en-US" sz="3200" dirty="0" smtClean="0"/>
               <a:t>“</a:t>
             </a:r>
             <a:r>
-              <a:rPr lang="en-US" sz="2400" i="1" dirty="0" smtClean="0"/>
+              <a:rPr lang="en-US" sz="3200" i="1" dirty="0" smtClean="0"/>
               <a:t>hack</a:t>
             </a:r>
             <a:r>
-              <a:rPr lang="en-US" sz="2400" dirty="0" smtClean="0"/>
+              <a:rPr lang="en-US" sz="3200" dirty="0" smtClean="0"/>
               <a:t>”</a:t>
             </a:r>
-            <a:endParaRPr lang="en-US" sz="2400" dirty="0"/>
+            <a:endParaRPr lang="en-US" sz="3200" dirty="0"/>
           </a:p>
         </p:txBody>
       </p:sp>
@@ -5477,8 +5537,8 @@
         </p:nvSpPr>
         <p:spPr>
           <a:xfrm>
-            <a:off x="2768732" y="4395894"/>
-            <a:ext cx="1879992" cy="461665"/>
+            <a:off x="2768732" y="4093098"/>
+            <a:ext cx="2444299" cy="584776"/>
           </a:xfrm>
           <a:prstGeom prst="rect">
             <a:avLst/>
@@ -5492,18 +5552,18 @@
           <a:lstStyle/>
           <a:p>
             <a:r>
-              <a:rPr lang="en-US" sz="2400" dirty="0"/>
+              <a:rPr lang="en-US" sz="3200" dirty="0"/>
               <a:t>“</a:t>
             </a:r>
             <a:r>
-              <a:rPr lang="en-US" sz="2400" i="1" dirty="0"/>
+              <a:rPr lang="en-US" sz="3200" i="1" dirty="0"/>
               <a:t>fix this crap</a:t>
             </a:r>
             <a:r>
-              <a:rPr lang="en-US" sz="2400" dirty="0"/>
+              <a:rPr lang="en-US" sz="3200" dirty="0"/>
               <a:t>”</a:t>
             </a:r>
-            <a:endParaRPr lang="en-US" sz="2400" dirty="0"/>
+            <a:endParaRPr lang="en-US" sz="3200" dirty="0"/>
           </a:p>
         </p:txBody>
       </p:sp>
@@ -5515,7 +5575,7 @@
         </p:nvGrpSpPr>
         <p:grpSpPr>
           <a:xfrm>
-            <a:off x="830177" y="3047264"/>
+            <a:off x="902353" y="2862622"/>
             <a:ext cx="8241647" cy="1295400"/>
             <a:chOff x="895926" y="4724400"/>
             <a:chExt cx="8241647" cy="1295400"/>
@@ -5580,7 +5640,7 @@
           <p:spPr>
             <a:xfrm>
               <a:off x="1759003" y="5005045"/>
-              <a:ext cx="7378570" cy="584776"/>
+              <a:ext cx="7378570" cy="646331"/>
             </a:xfrm>
             <a:prstGeom prst="rect">
               <a:avLst/>
@@ -5594,14 +5654,14 @@
             <a:lstStyle/>
             <a:p>
               <a:r>
-                <a:rPr lang="en-US" sz="3200" b="1" dirty="0" smtClean="0">
+                <a:rPr lang="en-US" sz="3600" b="1" dirty="0" smtClean="0">
                   <a:solidFill>
                     <a:schemeClr val="bg1"/>
                   </a:solidFill>
                 </a:rPr>
                 <a:t>Self-Admitted Technical Debt</a:t>
               </a:r>
-              <a:endParaRPr lang="en-US" sz="3200" b="1" dirty="0">
+              <a:endParaRPr lang="en-US" sz="3600" b="1" dirty="0">
                 <a:solidFill>
                   <a:schemeClr val="bg1"/>
                 </a:solidFill>
@@ -6072,8 +6132,8 @@
         </p:nvSpPr>
         <p:spPr>
           <a:xfrm>
-            <a:off x="2027537" y="1786926"/>
-            <a:ext cx="4669129" cy="461665"/>
+            <a:off x="1489296" y="1576651"/>
+            <a:ext cx="6155598" cy="584776"/>
           </a:xfrm>
           <a:prstGeom prst="rect">
             <a:avLst/>
@@ -6087,22 +6147,22 @@
           <a:lstStyle/>
           <a:p>
             <a:r>
-              <a:rPr lang="en-US" sz="2400" dirty="0" smtClean="0"/>
+              <a:rPr lang="en-US" sz="3200" dirty="0" smtClean="0"/>
               <a:t>Technical debt </a:t>
             </a:r>
             <a:r>
-              <a:rPr lang="en-US" sz="2400" dirty="0" smtClean="0"/>
+              <a:rPr lang="en-US" sz="3200" dirty="0" smtClean="0"/>
               <a:t>is a </a:t>
             </a:r>
             <a:r>
-              <a:rPr lang="en-US" sz="2400" b="1" dirty="0" smtClean="0"/>
+              <a:rPr lang="en-US" sz="3200" b="1" dirty="0" smtClean="0"/>
               <a:t>broad </a:t>
             </a:r>
             <a:r>
-              <a:rPr lang="en-US" sz="2400" dirty="0" smtClean="0"/>
+              <a:rPr lang="en-US" sz="3200" dirty="0" smtClean="0"/>
               <a:t>concept: </a:t>
             </a:r>
-            <a:endParaRPr lang="en-US" sz="2400" dirty="0"/>
+            <a:endParaRPr lang="en-US" sz="3200" dirty="0"/>
           </a:p>
         </p:txBody>
       </p:sp>
@@ -6114,8 +6174,8 @@
         </p:nvSpPr>
         <p:spPr>
           <a:xfrm>
-            <a:off x="1409789" y="4232118"/>
-            <a:ext cx="6195451" cy="523220"/>
+            <a:off x="720169" y="4232118"/>
+            <a:ext cx="7912818" cy="646331"/>
           </a:xfrm>
           <a:prstGeom prst="rect">
             <a:avLst/>
@@ -6129,18 +6189,18 @@
           <a:lstStyle/>
           <a:p>
             <a:r>
-              <a:rPr lang="en-US" sz="2800" dirty="0" smtClean="0"/>
+              <a:rPr lang="en-US" sz="3600" dirty="0" smtClean="0"/>
               <a:t>What are the </a:t>
             </a:r>
             <a:r>
-              <a:rPr lang="en-US" sz="2800" b="1" dirty="0" smtClean="0"/>
+              <a:rPr lang="en-US" sz="3600" b="1" dirty="0" smtClean="0"/>
               <a:t>types</a:t>
             </a:r>
             <a:r>
-              <a:rPr lang="en-US" sz="2800" dirty="0" smtClean="0"/>
+              <a:rPr lang="en-US" sz="3600" dirty="0" smtClean="0"/>
               <a:t> of Self-Admitted TD ?</a:t>
             </a:r>
-            <a:endParaRPr lang="en-US" dirty="0"/>
+            <a:endParaRPr lang="en-US" sz="3600" dirty="0"/>
           </a:p>
         </p:txBody>
       </p:sp>
@@ -6194,8 +6254,8 @@
         </p:blipFill>
         <p:spPr>
           <a:xfrm>
-            <a:off x="1746332" y="2509284"/>
-            <a:ext cx="281205" cy="1284596"/>
+            <a:off x="1746332" y="2365977"/>
+            <a:ext cx="328948" cy="1502693"/>
           </a:xfrm>
           <a:prstGeom prst="rect">
             <a:avLst/>
@@ -6210,8 +6270,8 @@
         </p:nvSpPr>
         <p:spPr>
           <a:xfrm>
-            <a:off x="2111803" y="3356915"/>
-            <a:ext cx="3163450" cy="461665"/>
+            <a:off x="2111802" y="3180284"/>
+            <a:ext cx="4441397" cy="646331"/>
           </a:xfrm>
           <a:prstGeom prst="rect">
             <a:avLst/>
@@ -6225,12 +6285,16 @@
           <a:lstStyle/>
           <a:p>
             <a:r>
-              <a:rPr lang="en-US" sz="2400" b="1" dirty="0" smtClean="0"/>
+              <a:rPr lang="en-US" sz="3600" b="1" dirty="0" smtClean="0"/>
               <a:t>Requirement </a:t>
             </a:r>
             <a:r>
+              <a:rPr lang="en-US" sz="3600" dirty="0" smtClean="0"/>
+              <a:t>debt …</a:t>
+            </a:r>
+            <a:r>
               <a:rPr lang="en-US" sz="2400" dirty="0" smtClean="0"/>
-              <a:t>debt … </a:t>
+              <a:t> </a:t>
             </a:r>
             <a:endParaRPr lang="en-US" sz="2400" dirty="0"/>
           </a:p>
@@ -6244,8 +6308,8 @@
         </p:nvSpPr>
         <p:spPr>
           <a:xfrm>
-            <a:off x="2093962" y="2433585"/>
-            <a:ext cx="2053301" cy="461665"/>
+            <a:off x="2111803" y="2256954"/>
+            <a:ext cx="2733498" cy="646331"/>
           </a:xfrm>
           <a:prstGeom prst="rect">
             <a:avLst/>
@@ -6259,19 +6323,19 @@
           <a:lstStyle/>
           <a:p>
             <a:r>
-              <a:rPr lang="en-US" sz="2400" b="1" dirty="0"/>
+              <a:rPr lang="en-US" sz="3600" b="1" dirty="0"/>
               <a:t>Design </a:t>
             </a:r>
             <a:r>
-              <a:rPr lang="en-US" sz="2400" dirty="0"/>
+              <a:rPr lang="en-US" sz="3600" dirty="0"/>
               <a:t>debt</a:t>
             </a:r>
             <a:r>
-              <a:rPr lang="en-US" sz="2400" b="1" dirty="0"/>
+              <a:rPr lang="en-US" sz="3600" b="1" dirty="0"/>
               <a:t> </a:t>
             </a:r>
             <a:r>
-              <a:rPr lang="en-US" sz="2400" dirty="0"/>
+              <a:rPr lang="en-US" sz="3600" dirty="0"/>
               <a:t>, </a:t>
             </a:r>
           </a:p>
@@ -6285,8 +6349,8 @@
         </p:nvSpPr>
         <p:spPr>
           <a:xfrm>
-            <a:off x="2093962" y="2895250"/>
-            <a:ext cx="3163450" cy="461665"/>
+            <a:off x="2111802" y="2718619"/>
+            <a:ext cx="4459239" cy="646331"/>
           </a:xfrm>
           <a:prstGeom prst="rect">
             <a:avLst/>
@@ -6300,12 +6364,16 @@
           <a:lstStyle/>
           <a:p>
             <a:r>
-              <a:rPr lang="en-US" sz="2400" b="1" dirty="0" smtClean="0"/>
+              <a:rPr lang="en-US" sz="3600" b="1" dirty="0" smtClean="0"/>
               <a:t>Documentation </a:t>
             </a:r>
             <a:r>
+              <a:rPr lang="en-US" sz="3600" dirty="0" smtClean="0"/>
+              <a:t>debt,</a:t>
+            </a:r>
+            <a:r>
               <a:rPr lang="en-US" sz="2400" dirty="0" smtClean="0"/>
-              <a:t>debt, </a:t>
+              <a:t> </a:t>
             </a:r>
             <a:endParaRPr lang="en-US" sz="2400" dirty="0"/>
           </a:p>
@@ -6854,6 +6922,18 @@
               <a:t>JFreeChart</a:t>
             </a:r>
             <a:r>
+              <a:rPr lang="en-US" sz="2800" i="1" dirty="0"/>
+              <a:t> </a:t>
+            </a:r>
+            <a:r>
+              <a:rPr lang="en-US" sz="2800" i="1" dirty="0" smtClean="0"/>
+              <a:t>and </a:t>
+            </a:r>
+            <a:r>
+              <a:rPr lang="en-US" sz="2800" i="1" dirty="0" err="1" smtClean="0"/>
+              <a:t>Jmeter</a:t>
+            </a:r>
+            <a:r>
               <a:rPr lang="en-US" sz="2800" dirty="0" smtClean="0"/>
               <a:t>)</a:t>
             </a:r>
@@ -7709,10 +7789,10 @@
         </p:nvGrpSpPr>
         <p:grpSpPr>
           <a:xfrm>
-            <a:off x="884484" y="3334533"/>
-            <a:ext cx="7694980" cy="1295400"/>
+            <a:off x="662641" y="3382302"/>
+            <a:ext cx="7493135" cy="1295400"/>
             <a:chOff x="895926" y="4724400"/>
-            <a:chExt cx="7694980" cy="1295400"/>
+            <a:chExt cx="7493135" cy="1295400"/>
           </a:xfrm>
         </p:grpSpPr>
         <p:sp>
@@ -7773,8 +7853,8 @@
           </p:nvSpPr>
           <p:spPr>
             <a:xfrm>
-              <a:off x="1212336" y="5040633"/>
-              <a:ext cx="7378570" cy="584776"/>
+              <a:off x="1010491" y="5040633"/>
+              <a:ext cx="7378570" cy="646331"/>
             </a:xfrm>
             <a:prstGeom prst="rect">
               <a:avLst/>
@@ -7788,14 +7868,14 @@
             <a:lstStyle/>
             <a:p>
               <a:r>
-                <a:rPr lang="en-US" sz="3200" b="1" dirty="0" smtClean="0">
+                <a:rPr lang="en-US" sz="3600" b="1" dirty="0" smtClean="0">
                   <a:solidFill>
                     <a:schemeClr val="bg1"/>
                   </a:solidFill>
                 </a:rPr>
                 <a:t>We ended up with 33,093 comments</a:t>
               </a:r>
-              <a:endParaRPr lang="en-US" sz="3200" b="1" dirty="0">
+              <a:endParaRPr lang="en-US" sz="3600" b="1" dirty="0">
                 <a:solidFill>
                   <a:schemeClr val="bg1"/>
                 </a:solidFill>
@@ -8293,255 +8373,6 @@
           <a:chExt cx="0" cy="0"/>
         </a:xfrm>
       </p:grpSpPr>
-      <p:grpSp>
-        <p:nvGrpSpPr>
-          <p:cNvPr id="38" name="Group 37"/>
-          <p:cNvGrpSpPr/>
-          <p:nvPr/>
-        </p:nvGrpSpPr>
-        <p:grpSpPr>
-          <a:xfrm>
-            <a:off x="1211076" y="3288643"/>
-            <a:ext cx="6660869" cy="3633266"/>
-            <a:chOff x="1463376" y="3288643"/>
-            <a:chExt cx="6385453" cy="3633266"/>
-          </a:xfrm>
-        </p:grpSpPr>
-        <p:grpSp>
-          <p:nvGrpSpPr>
-            <p:cNvPr id="28" name="Group 27"/>
-            <p:cNvGrpSpPr/>
-            <p:nvPr/>
-          </p:nvGrpSpPr>
-          <p:grpSpPr>
-            <a:xfrm>
-              <a:off x="1463376" y="3288643"/>
-              <a:ext cx="6385453" cy="3633266"/>
-              <a:chOff x="269127" y="1219200"/>
-              <a:chExt cx="8487418" cy="4592222"/>
-            </a:xfrm>
-          </p:grpSpPr>
-          <p:pic>
-            <p:nvPicPr>
-              <p:cNvPr id="29" name="Picture 28" descr="technical_debt_distribution.pdf"/>
-              <p:cNvPicPr>
-                <a:picLocks noChangeAspect="1"/>
-              </p:cNvPicPr>
-              <p:nvPr/>
-            </p:nvPicPr>
-            <p:blipFill>
-              <a:blip r:embed="rId3">
-                <a:extLst>
-                  <a:ext uri="{28A0092B-C50C-407E-A947-70E740481C1C}">
-                    <a14:useLocalDpi xmlns:a14="http://schemas.microsoft.com/office/drawing/2010/main" val="0"/>
-                  </a:ext>
-                </a:extLst>
-              </a:blip>
-              <a:stretch>
-                <a:fillRect/>
-              </a:stretch>
-            </p:blipFill>
-            <p:spPr>
-              <a:xfrm>
-                <a:off x="269127" y="1219200"/>
-                <a:ext cx="7838315" cy="4592222"/>
-              </a:xfrm>
-              <a:prstGeom prst="rect">
-                <a:avLst/>
-              </a:prstGeom>
-            </p:spPr>
-          </p:pic>
-          <p:pic>
-            <p:nvPicPr>
-              <p:cNvPr id="30" name="Picture 29" descr="technical_debt_distribution.pdf"/>
-              <p:cNvPicPr>
-                <a:picLocks noChangeAspect="1"/>
-              </p:cNvPicPr>
-              <p:nvPr/>
-            </p:nvPicPr>
-            <p:blipFill rotWithShape="1">
-              <a:blip r:embed="rId3">
-                <a:extLst>
-                  <a:ext uri="{28A0092B-C50C-407E-A947-70E740481C1C}">
-                    <a14:useLocalDpi xmlns:a14="http://schemas.microsoft.com/office/drawing/2010/main" val="0"/>
-                  </a:ext>
-                </a:extLst>
-              </a:blip>
-              <a:srcRect l="72958" t="16854" r="6806" b="69927"/>
-              <a:stretch/>
-            </p:blipFill>
-            <p:spPr>
-              <a:xfrm>
-                <a:off x="5855842" y="1873778"/>
-                <a:ext cx="2900703" cy="1110234"/>
-              </a:xfrm>
-              <a:prstGeom prst="rect">
-                <a:avLst/>
-              </a:prstGeom>
-            </p:spPr>
-          </p:pic>
-        </p:grpSp>
-        <p:grpSp>
-          <p:nvGrpSpPr>
-            <p:cNvPr id="32" name="Group 31"/>
-            <p:cNvGrpSpPr/>
-            <p:nvPr/>
-          </p:nvGrpSpPr>
-          <p:grpSpPr>
-            <a:xfrm>
-              <a:off x="2078337" y="6482709"/>
-              <a:ext cx="5011468" cy="421502"/>
-              <a:chOff x="313210" y="4021395"/>
-              <a:chExt cx="5011468" cy="421502"/>
-            </a:xfrm>
-          </p:grpSpPr>
-          <p:pic>
-            <p:nvPicPr>
-              <p:cNvPr id="33" name="Picture 32" descr="technical_debt_distribution.pdf"/>
-              <p:cNvPicPr>
-                <a:picLocks noChangeAspect="1"/>
-              </p:cNvPicPr>
-              <p:nvPr/>
-            </p:nvPicPr>
-            <p:blipFill rotWithShape="1">
-              <a:blip r:embed="rId3">
-                <a:extLst>
-                  <a:ext uri="{28A0092B-C50C-407E-A947-70E740481C1C}">
-                    <a14:useLocalDpi xmlns:a14="http://schemas.microsoft.com/office/drawing/2010/main" val="0"/>
-                  </a:ext>
-                </a:extLst>
-              </a:blip>
-              <a:srcRect l="13841" t="88838" r="80825" b="5667"/>
-              <a:stretch/>
-            </p:blipFill>
-            <p:spPr>
-              <a:xfrm>
-                <a:off x="313210" y="4021395"/>
-                <a:ext cx="654980" cy="395311"/>
-              </a:xfrm>
-              <a:prstGeom prst="rect">
-                <a:avLst/>
-              </a:prstGeom>
-            </p:spPr>
-          </p:pic>
-          <p:pic>
-            <p:nvPicPr>
-              <p:cNvPr id="34" name="Picture 33" descr="technical_debt_distribution.pdf"/>
-              <p:cNvPicPr>
-                <a:picLocks noChangeAspect="1"/>
-              </p:cNvPicPr>
-              <p:nvPr/>
-            </p:nvPicPr>
-            <p:blipFill rotWithShape="1">
-              <a:blip r:embed="rId3">
-                <a:extLst>
-                  <a:ext uri="{28A0092B-C50C-407E-A947-70E740481C1C}">
-                    <a14:useLocalDpi xmlns:a14="http://schemas.microsoft.com/office/drawing/2010/main" val="0"/>
-                  </a:ext>
-                </a:extLst>
-              </a:blip>
-              <a:srcRect l="31092" t="88838" r="62744" b="5667"/>
-              <a:stretch/>
-            </p:blipFill>
-            <p:spPr>
-              <a:xfrm>
-                <a:off x="1338239" y="4021395"/>
-                <a:ext cx="756918" cy="395311"/>
-              </a:xfrm>
-              <a:prstGeom prst="rect">
-                <a:avLst/>
-              </a:prstGeom>
-            </p:spPr>
-          </p:pic>
-          <p:pic>
-            <p:nvPicPr>
-              <p:cNvPr id="35" name="Picture 34" descr="technical_debt_distribution.pdf"/>
-              <p:cNvPicPr>
-                <a:picLocks noChangeAspect="1"/>
-              </p:cNvPicPr>
-              <p:nvPr/>
-            </p:nvPicPr>
-            <p:blipFill rotWithShape="1">
-              <a:blip r:embed="rId3">
-                <a:extLst>
-                  <a:ext uri="{28A0092B-C50C-407E-A947-70E740481C1C}">
-                    <a14:useLocalDpi xmlns:a14="http://schemas.microsoft.com/office/drawing/2010/main" val="0"/>
-                  </a:ext>
-                </a:extLst>
-              </a:blip>
-              <a:srcRect l="47729" t="88838" r="44738" b="5667"/>
-              <a:stretch/>
-            </p:blipFill>
-            <p:spPr>
-              <a:xfrm>
-                <a:off x="2263362" y="4047586"/>
-                <a:ext cx="925123" cy="395311"/>
-              </a:xfrm>
-              <a:prstGeom prst="rect">
-                <a:avLst/>
-              </a:prstGeom>
-            </p:spPr>
-          </p:pic>
-          <p:pic>
-            <p:nvPicPr>
-              <p:cNvPr id="36" name="Picture 35" descr="technical_debt_distribution.pdf"/>
-              <p:cNvPicPr>
-                <a:picLocks noChangeAspect="1"/>
-              </p:cNvPicPr>
-              <p:nvPr/>
-            </p:nvPicPr>
-            <p:blipFill rotWithShape="1">
-              <a:blip r:embed="rId3">
-                <a:extLst>
-                  <a:ext uri="{28A0092B-C50C-407E-A947-70E740481C1C}">
-                    <a14:useLocalDpi xmlns:a14="http://schemas.microsoft.com/office/drawing/2010/main" val="0"/>
-                  </a:ext>
-                </a:extLst>
-              </a:blip>
-              <a:srcRect l="64849" t="88838" r="26659" b="5667"/>
-              <a:stretch/>
-            </p:blipFill>
-            <p:spPr>
-              <a:xfrm>
-                <a:off x="3255767" y="4047586"/>
-                <a:ext cx="1042866" cy="395311"/>
-              </a:xfrm>
-              <a:prstGeom prst="rect">
-                <a:avLst/>
-              </a:prstGeom>
-            </p:spPr>
-          </p:pic>
-          <p:pic>
-            <p:nvPicPr>
-              <p:cNvPr id="37" name="Picture 36" descr="technical_debt_distribution.pdf"/>
-              <p:cNvPicPr>
-                <a:picLocks noChangeAspect="1"/>
-              </p:cNvPicPr>
-              <p:nvPr/>
-            </p:nvPicPr>
-            <p:blipFill rotWithShape="1">
-              <a:blip r:embed="rId3">
-                <a:extLst>
-                  <a:ext uri="{28A0092B-C50C-407E-A947-70E740481C1C}">
-                    <a14:useLocalDpi xmlns:a14="http://schemas.microsoft.com/office/drawing/2010/main" val="0"/>
-                  </a:ext>
-                </a:extLst>
-              </a:blip>
-              <a:srcRect l="82585" t="88838" r="9813" b="6499"/>
-              <a:stretch/>
-            </p:blipFill>
-            <p:spPr>
-              <a:xfrm>
-                <a:off x="4391145" y="4021395"/>
-                <a:ext cx="933533" cy="335428"/>
-              </a:xfrm>
-              <a:prstGeom prst="rect">
-                <a:avLst/>
-              </a:prstGeom>
-            </p:spPr>
-          </p:pic>
-        </p:grpSp>
-      </p:grpSp>
       <p:sp>
         <p:nvSpPr>
           <p:cNvPr id="27" name="Title 1"/>
@@ -8630,14 +8461,14 @@
           <p:nvPr>
             <p:extLst>
               <p:ext uri="{D42A27DB-BD31-4B8C-83A1-F6EECF244321}">
-                <p14:modId xmlns:p14="http://schemas.microsoft.com/office/powerpoint/2010/main" val="2514615929"/>
+                <p14:modId xmlns:p14="http://schemas.microsoft.com/office/powerpoint/2010/main" val="4057310143"/>
               </p:ext>
             </p:extLst>
           </p:nvPr>
         </p:nvGraphicFramePr>
         <p:xfrm>
-          <a:off x="1158681" y="1018511"/>
-          <a:ext cx="6648098" cy="2494280"/>
+          <a:off x="513021" y="1567739"/>
+          <a:ext cx="8090622" cy="4208660"/>
         </p:xfrm>
         <a:graphic>
           <a:graphicData uri="http://schemas.openxmlformats.org/drawingml/2006/table">
@@ -8646,22 +8477,23 @@
                 <a:tableStyleId>{BC89EF96-8CEA-46FF-86C4-4CE0E7609802}</a:tableStyleId>
               </a:tblPr>
               <a:tblGrid>
-                <a:gridCol w="1181429"/>
-                <a:gridCol w="1504173"/>
-                <a:gridCol w="1865456"/>
-                <a:gridCol w="2097040"/>
+                <a:gridCol w="1900709"/>
+                <a:gridCol w="1967989"/>
+                <a:gridCol w="2220295"/>
+                <a:gridCol w="2001629"/>
               </a:tblGrid>
-              <a:tr h="370840">
+              <a:tr h="1042501">
                 <a:tc>
                   <a:txBody>
                     <a:bodyPr/>
                     <a:lstStyle/>
                     <a:p>
+                      <a:pPr algn="ctr"/>
                       <a:r>
-                        <a:rPr lang="en-US" dirty="0" smtClean="0"/>
+                        <a:rPr lang="en-US" sz="3200" dirty="0" smtClean="0"/>
                         <a:t>Project</a:t>
                       </a:r>
-                      <a:endParaRPr lang="en-US" dirty="0"/>
+                      <a:endParaRPr lang="en-US" sz="3200" dirty="0"/>
                     </a:p>
                   </a:txBody>
                   <a:tcPr/>
@@ -8673,14 +8505,14 @@
                     <a:p>
                       <a:pPr algn="ctr"/>
                       <a:r>
-                        <a:rPr lang="en-US" dirty="0" smtClean="0"/>
+                        <a:rPr lang="en-US" sz="2400" dirty="0" smtClean="0"/>
                         <a:t># of analyzed</a:t>
                       </a:r>
                       <a:r>
-                        <a:rPr lang="en-US" baseline="0" dirty="0" smtClean="0"/>
+                        <a:rPr lang="en-US" sz="2400" baseline="0" dirty="0" smtClean="0"/>
                         <a:t> comments</a:t>
                       </a:r>
-                      <a:endParaRPr lang="en-US" dirty="0"/>
+                      <a:endParaRPr lang="en-US" sz="2400" dirty="0"/>
                     </a:p>
                   </a:txBody>
                   <a:tcPr/>
@@ -8692,21 +8524,21 @@
                     <a:p>
                       <a:pPr algn="ctr"/>
                       <a:r>
-                        <a:rPr lang="en-US" dirty="0" smtClean="0"/>
+                        <a:rPr lang="en-US" sz="2400" dirty="0" smtClean="0"/>
                         <a:t># of self-admitted</a:t>
                       </a:r>
                       <a:r>
-                        <a:rPr lang="en-US" baseline="0" dirty="0" smtClean="0"/>
+                        <a:rPr lang="en-US" sz="2400" baseline="0" dirty="0" smtClean="0"/>
                         <a:t> </a:t>
                       </a:r>
                     </a:p>
                     <a:p>
                       <a:pPr algn="ctr"/>
                       <a:r>
-                        <a:rPr lang="en-US" baseline="0" dirty="0" smtClean="0"/>
+                        <a:rPr lang="en-US" sz="2400" baseline="0" dirty="0" smtClean="0"/>
                         <a:t>TD comments</a:t>
                       </a:r>
-                      <a:endParaRPr lang="en-US" dirty="0"/>
+                      <a:endParaRPr lang="en-US" sz="2400" dirty="0"/>
                     </a:p>
                   </a:txBody>
                   <a:tcPr/>
@@ -8718,30 +8550,30 @@
                     <a:p>
                       <a:pPr algn="ctr"/>
                       <a:r>
-                        <a:rPr lang="en-US" dirty="0" smtClean="0"/>
+                        <a:rPr lang="en-US" sz="2400" dirty="0" smtClean="0"/>
                         <a:t>% of self-admitted</a:t>
                       </a:r>
                       <a:r>
-                        <a:rPr lang="en-US" baseline="0" dirty="0" smtClean="0"/>
+                        <a:rPr lang="en-US" sz="2400" baseline="0" dirty="0" smtClean="0"/>
                         <a:t> TD per project</a:t>
                       </a:r>
-                      <a:endParaRPr lang="en-US" dirty="0"/>
+                      <a:endParaRPr lang="en-US" sz="2400" dirty="0"/>
                     </a:p>
                   </a:txBody>
                   <a:tcPr/>
                 </a:tc>
               </a:tr>
-              <a:tr h="370840">
+              <a:tr h="603988">
                 <a:tc>
                   <a:txBody>
                     <a:bodyPr/>
                     <a:lstStyle/>
                     <a:p>
                       <a:r>
-                        <a:rPr lang="en-US" dirty="0" smtClean="0"/>
+                        <a:rPr lang="en-US" sz="3200" dirty="0" smtClean="0"/>
                         <a:t>Ant</a:t>
                       </a:r>
-                      <a:endParaRPr lang="en-US" dirty="0"/>
+                      <a:endParaRPr lang="en-US" sz="3200" dirty="0"/>
                     </a:p>
                   </a:txBody>
                   <a:tcPr/>
@@ -8753,10 +8585,10 @@
                     <a:p>
                       <a:pPr algn="r"/>
                       <a:r>
-                        <a:rPr lang="en-US" dirty="0" smtClean="0"/>
+                        <a:rPr lang="en-US" sz="3200" dirty="0" smtClean="0"/>
                         <a:t>4,140</a:t>
                       </a:r>
-                      <a:endParaRPr lang="en-US" dirty="0"/>
+                      <a:endParaRPr lang="en-US" sz="3200" dirty="0"/>
                     </a:p>
                   </a:txBody>
                   <a:tcPr/>
@@ -8768,10 +8600,10 @@
                     <a:p>
                       <a:pPr algn="r"/>
                       <a:r>
-                        <a:rPr lang="en-US" dirty="0" smtClean="0"/>
+                        <a:rPr lang="en-US" sz="3200" dirty="0" smtClean="0"/>
                         <a:t>134</a:t>
                       </a:r>
-                      <a:endParaRPr lang="en-US" dirty="0"/>
+                      <a:endParaRPr lang="en-US" sz="3200" dirty="0"/>
                     </a:p>
                   </a:txBody>
                   <a:tcPr/>
@@ -8783,26 +8615,26 @@
                     <a:p>
                       <a:pPr algn="ctr"/>
                       <a:r>
-                        <a:rPr lang="en-US" dirty="0" smtClean="0"/>
+                        <a:rPr lang="en-US" sz="3200" b="1" dirty="0" smtClean="0"/>
                         <a:t>3.2</a:t>
                       </a:r>
-                      <a:endParaRPr lang="en-US" dirty="0"/>
+                      <a:endParaRPr lang="en-US" sz="3200" b="1" dirty="0"/>
                     </a:p>
                   </a:txBody>
                   <a:tcPr/>
                 </a:tc>
               </a:tr>
-              <a:tr h="370840">
+              <a:tr h="603988">
                 <a:tc>
                   <a:txBody>
                     <a:bodyPr/>
                     <a:lstStyle/>
                     <a:p>
                       <a:r>
-                        <a:rPr lang="en-US" dirty="0" err="1" smtClean="0"/>
+                        <a:rPr lang="en-US" sz="3200" dirty="0" err="1" smtClean="0"/>
                         <a:t>ArgoUML</a:t>
                       </a:r>
-                      <a:endParaRPr lang="en-US" dirty="0"/>
+                      <a:endParaRPr lang="en-US" sz="3200" dirty="0"/>
                     </a:p>
                   </a:txBody>
                   <a:tcPr/>
@@ -8814,10 +8646,10 @@
                     <a:p>
                       <a:pPr algn="r"/>
                       <a:r>
-                        <a:rPr lang="en-US" dirty="0" smtClean="0"/>
+                        <a:rPr lang="en-US" sz="3200" dirty="0" smtClean="0"/>
                         <a:t>9,788</a:t>
                       </a:r>
-                      <a:endParaRPr lang="en-US" dirty="0"/>
+                      <a:endParaRPr lang="en-US" sz="3200" dirty="0"/>
                     </a:p>
                   </a:txBody>
                   <a:tcPr/>
@@ -8829,10 +8661,10 @@
                     <a:p>
                       <a:pPr algn="r"/>
                       <a:r>
-                        <a:rPr lang="en-US" dirty="0" smtClean="0"/>
+                        <a:rPr lang="en-US" sz="3200" dirty="0" smtClean="0"/>
                         <a:t>1,653</a:t>
                       </a:r>
-                      <a:endParaRPr lang="en-US" dirty="0"/>
+                      <a:endParaRPr lang="en-US" sz="3200" dirty="0"/>
                     </a:p>
                   </a:txBody>
                   <a:tcPr/>
@@ -8844,26 +8676,26 @@
                     <a:p>
                       <a:pPr algn="ctr"/>
                       <a:r>
-                        <a:rPr lang="en-US" dirty="0" smtClean="0"/>
+                        <a:rPr lang="en-US" sz="3200" b="1" dirty="0" smtClean="0"/>
                         <a:t>16.8</a:t>
                       </a:r>
-                      <a:endParaRPr lang="en-US" dirty="0"/>
+                      <a:endParaRPr lang="en-US" sz="3200" b="1" dirty="0"/>
                     </a:p>
                   </a:txBody>
                   <a:tcPr/>
                 </a:tc>
               </a:tr>
-              <a:tr h="370840">
+              <a:tr h="603988">
                 <a:tc>
                   <a:txBody>
                     <a:bodyPr/>
                     <a:lstStyle/>
                     <a:p>
                       <a:r>
-                        <a:rPr lang="en-US" dirty="0" smtClean="0"/>
+                        <a:rPr lang="en-US" sz="3200" dirty="0" smtClean="0"/>
                         <a:t>Columba</a:t>
                       </a:r>
-                      <a:endParaRPr lang="en-US" dirty="0"/>
+                      <a:endParaRPr lang="en-US" sz="3200" dirty="0"/>
                     </a:p>
                   </a:txBody>
                   <a:tcPr/>
@@ -8875,10 +8707,10 @@
                     <a:p>
                       <a:pPr algn="r"/>
                       <a:r>
-                        <a:rPr lang="en-US" dirty="0" smtClean="0"/>
+                        <a:rPr lang="en-US" sz="3200" dirty="0" smtClean="0"/>
                         <a:t>6,569</a:t>
                       </a:r>
-                      <a:endParaRPr lang="en-US" dirty="0"/>
+                      <a:endParaRPr lang="en-US" sz="3200" dirty="0"/>
                     </a:p>
                   </a:txBody>
                   <a:tcPr/>
@@ -8890,10 +8722,10 @@
                     <a:p>
                       <a:pPr algn="r"/>
                       <a:r>
-                        <a:rPr lang="en-US" dirty="0" smtClean="0"/>
+                        <a:rPr lang="en-US" sz="3200" dirty="0" smtClean="0"/>
                         <a:t>295</a:t>
                       </a:r>
-                      <a:endParaRPr lang="en-US" dirty="0"/>
+                      <a:endParaRPr lang="en-US" sz="3200" dirty="0"/>
                     </a:p>
                   </a:txBody>
                   <a:tcPr/>
@@ -8905,26 +8737,26 @@
                     <a:p>
                       <a:pPr algn="ctr"/>
                       <a:r>
-                        <a:rPr lang="en-US" dirty="0" smtClean="0"/>
+                        <a:rPr lang="en-US" sz="3200" b="1" dirty="0" smtClean="0"/>
                         <a:t>4.4</a:t>
                       </a:r>
-                      <a:endParaRPr lang="en-US" dirty="0"/>
+                      <a:endParaRPr lang="en-US" sz="3200" b="1" dirty="0"/>
                     </a:p>
                   </a:txBody>
                   <a:tcPr/>
                 </a:tc>
               </a:tr>
-              <a:tr h="370840">
+              <a:tr h="603988">
                 <a:tc>
                   <a:txBody>
                     <a:bodyPr/>
                     <a:lstStyle/>
                     <a:p>
                       <a:r>
-                        <a:rPr lang="en-US" dirty="0" err="1" smtClean="0"/>
+                        <a:rPr lang="en-US" sz="3100" dirty="0" err="1" smtClean="0"/>
                         <a:t>JFreeChart</a:t>
                       </a:r>
-                      <a:endParaRPr lang="en-US" dirty="0"/>
+                      <a:endParaRPr lang="en-US" sz="3100" dirty="0"/>
                     </a:p>
                   </a:txBody>
                   <a:tcPr/>
@@ -8936,10 +8768,10 @@
                     <a:p>
                       <a:pPr algn="r"/>
                       <a:r>
-                        <a:rPr lang="en-US" dirty="0" smtClean="0"/>
+                        <a:rPr lang="en-US" sz="3200" dirty="0" smtClean="0"/>
                         <a:t>4,433</a:t>
                       </a:r>
-                      <a:endParaRPr lang="en-US" dirty="0"/>
+                      <a:endParaRPr lang="en-US" sz="3200" dirty="0"/>
                     </a:p>
                   </a:txBody>
                   <a:tcPr/>
@@ -8951,10 +8783,10 @@
                     <a:p>
                       <a:pPr algn="r"/>
                       <a:r>
-                        <a:rPr lang="en-US" dirty="0" smtClean="0"/>
+                        <a:rPr lang="en-US" sz="3200" dirty="0" smtClean="0"/>
                         <a:t>219</a:t>
                       </a:r>
-                      <a:endParaRPr lang="en-US" dirty="0"/>
+                      <a:endParaRPr lang="en-US" sz="3200" dirty="0"/>
                     </a:p>
                   </a:txBody>
                   <a:tcPr/>
@@ -8966,26 +8798,26 @@
                     <a:p>
                       <a:pPr algn="ctr"/>
                       <a:r>
-                        <a:rPr lang="en-US" dirty="0" smtClean="0"/>
+                        <a:rPr lang="en-US" sz="3200" b="1" dirty="0" smtClean="0"/>
                         <a:t>4.9</a:t>
                       </a:r>
-                      <a:endParaRPr lang="en-US" dirty="0"/>
+                      <a:endParaRPr lang="en-US" sz="3200" b="1" dirty="0"/>
                     </a:p>
                   </a:txBody>
                   <a:tcPr/>
                 </a:tc>
               </a:tr>
-              <a:tr h="370840">
+              <a:tr h="603988">
                 <a:tc>
                   <a:txBody>
                     <a:bodyPr/>
                     <a:lstStyle/>
                     <a:p>
                       <a:r>
-                        <a:rPr lang="en-US" dirty="0" err="1" smtClean="0"/>
+                        <a:rPr lang="en-US" sz="3200" dirty="0" err="1" smtClean="0"/>
                         <a:t>Jmeter</a:t>
                       </a:r>
-                      <a:endParaRPr lang="en-US" dirty="0"/>
+                      <a:endParaRPr lang="en-US" sz="3200" dirty="0"/>
                     </a:p>
                   </a:txBody>
                   <a:tcPr/>
@@ -8997,10 +8829,10 @@
                     <a:p>
                       <a:pPr algn="r"/>
                       <a:r>
-                        <a:rPr lang="en-US" dirty="0" smtClean="0"/>
+                        <a:rPr lang="en-US" sz="3200" dirty="0" smtClean="0"/>
                         <a:t>8,163</a:t>
                       </a:r>
-                      <a:endParaRPr lang="en-US" dirty="0"/>
+                      <a:endParaRPr lang="en-US" sz="3200" dirty="0"/>
                     </a:p>
                   </a:txBody>
                   <a:tcPr/>
@@ -9012,10 +8844,10 @@
                     <a:p>
                       <a:pPr algn="r"/>
                       <a:r>
-                        <a:rPr lang="en-US" dirty="0" smtClean="0"/>
+                        <a:rPr lang="en-US" sz="3200" dirty="0" smtClean="0"/>
                         <a:t>375</a:t>
                       </a:r>
-                      <a:endParaRPr lang="en-US" dirty="0"/>
+                      <a:endParaRPr lang="en-US" sz="3200" dirty="0"/>
                     </a:p>
                   </a:txBody>
                   <a:tcPr/>
@@ -9027,10 +8859,10 @@
                     <a:p>
                       <a:pPr algn="ctr"/>
                       <a:r>
-                        <a:rPr lang="en-US" dirty="0" smtClean="0"/>
+                        <a:rPr lang="en-US" sz="3200" b="1" dirty="0" smtClean="0"/>
                         <a:t>4.6</a:t>
                       </a:r>
-                      <a:endParaRPr lang="en-US" dirty="0"/>
+                      <a:endParaRPr lang="en-US" sz="3200" b="1" dirty="0"/>
                     </a:p>
                   </a:txBody>
                   <a:tcPr/>
@@ -9044,6 +8876,702 @@
     <p:extLst>
       <p:ext uri="{BB962C8B-B14F-4D97-AF65-F5344CB8AC3E}">
         <p14:creationId xmlns:p14="http://schemas.microsoft.com/office/powerpoint/2010/main" val="3078496447"/>
+      </p:ext>
+    </p:extLst>
+  </p:cSld>
+  <p:clrMapOvr>
+    <a:masterClrMapping/>
+  </p:clrMapOvr>
+  <p:timing>
+    <p:tnLst>
+      <p:par>
+        <p:cTn xmlns:p14="http://schemas.microsoft.com/office/powerpoint/2010/main" id="1" dur="indefinite" restart="never" nodeType="tmRoot"/>
+      </p:par>
+    </p:tnLst>
+  </p:timing>
+</p:sld>
+</file>
+
+<file path=ppt/slides/slide8.xml><?xml version="1.0" encoding="utf-8"?>
+<p:sld xmlns:a="http://schemas.openxmlformats.org/drawingml/2006/main" xmlns:r="http://schemas.openxmlformats.org/officeDocument/2006/relationships" xmlns:p="http://schemas.openxmlformats.org/presentationml/2006/main">
+  <p:cSld>
+    <p:spTree>
+      <p:nvGrpSpPr>
+        <p:cNvPr id="1" name=""/>
+        <p:cNvGrpSpPr/>
+        <p:nvPr/>
+      </p:nvGrpSpPr>
+      <p:grpSpPr>
+        <a:xfrm>
+          <a:off x="0" y="0"/>
+          <a:ext cx="0" cy="0"/>
+          <a:chOff x="0" y="0"/>
+          <a:chExt cx="0" cy="0"/>
+        </a:xfrm>
+      </p:grpSpPr>
+      <p:sp>
+        <p:nvSpPr>
+          <p:cNvPr id="27" name="Title 1"/>
+          <p:cNvSpPr>
+            <a:spLocks noGrp="1"/>
+          </p:cNvSpPr>
+          <p:nvPr>
+            <p:ph type="title"/>
+          </p:nvPr>
+        </p:nvSpPr>
+        <p:spPr>
+          <a:xfrm>
+            <a:off x="177864" y="0"/>
+            <a:ext cx="8458200" cy="1143000"/>
+          </a:xfrm>
+        </p:spPr>
+        <p:txBody>
+          <a:bodyPr>
+            <a:normAutofit/>
+          </a:bodyPr>
+          <a:lstStyle/>
+          <a:p>
+            <a:pPr algn="l" fontAlgn="base">
+              <a:spcAft>
+                <a:spcPct val="0"/>
+              </a:spcAft>
+            </a:pPr>
+            <a:r>
+              <a:rPr lang="en-US" b="1" dirty="0" smtClean="0">
+                <a:solidFill>
+                  <a:srgbClr val="C00000"/>
+                </a:solidFill>
+              </a:rPr>
+              <a:t>Classification </a:t>
+            </a:r>
+            <a:r>
+              <a:rPr lang="en-US" b="1" dirty="0" smtClean="0">
+                <a:solidFill>
+                  <a:srgbClr val="C00000"/>
+                </a:solidFill>
+              </a:rPr>
+              <a:t>Results</a:t>
+            </a:r>
+            <a:endParaRPr lang="en-US" b="1" dirty="0">
+              <a:solidFill>
+                <a:srgbClr val="C00000"/>
+              </a:solidFill>
+            </a:endParaRPr>
+          </a:p>
+        </p:txBody>
+      </p:sp>
+      <p:sp>
+        <p:nvSpPr>
+          <p:cNvPr id="3" name="Slide Number Placeholder 2"/>
+          <p:cNvSpPr>
+            <a:spLocks noGrp="1"/>
+          </p:cNvSpPr>
+          <p:nvPr>
+            <p:ph type="sldNum" sz="quarter" idx="12"/>
+          </p:nvPr>
+        </p:nvSpPr>
+        <p:spPr>
+          <a:xfrm>
+            <a:off x="6544281" y="6326337"/>
+            <a:ext cx="2133600" cy="365125"/>
+          </a:xfrm>
+        </p:spPr>
+        <p:txBody>
+          <a:bodyPr/>
+          <a:lstStyle/>
+          <a:p>
+            <a:fld id="{60927F4E-78AB-4E26-A0B2-E6DA284CA8FF}" type="slidenum">
+              <a:rPr lang="en-US" smtClean="0"/>
+              <a:t>8</a:t>
+            </a:fld>
+            <a:endParaRPr lang="en-US"/>
+          </a:p>
+        </p:txBody>
+      </p:sp>
+      <p:sp>
+        <p:nvSpPr>
+          <p:cNvPr id="15" name="TextBox 14"/>
+          <p:cNvSpPr txBox="1"/>
+          <p:nvPr/>
+        </p:nvSpPr>
+        <p:spPr>
+          <a:xfrm>
+            <a:off x="362946" y="1416374"/>
+            <a:ext cx="2362946" cy="584776"/>
+          </a:xfrm>
+          <a:prstGeom prst="rect">
+            <a:avLst/>
+          </a:prstGeom>
+          <a:noFill/>
+        </p:spPr>
+        <p:txBody>
+          <a:bodyPr wrap="none" rtlCol="0">
+            <a:spAutoFit/>
+          </a:bodyPr>
+          <a:lstStyle/>
+          <a:p>
+            <a:r>
+              <a:rPr lang="en-US" sz="3200" b="1" dirty="0" smtClean="0">
+                <a:solidFill>
+                  <a:schemeClr val="bg1">
+                    <a:lumMod val="65000"/>
+                  </a:schemeClr>
+                </a:solidFill>
+              </a:rPr>
+              <a:t>Design Debt:</a:t>
+            </a:r>
+            <a:endParaRPr lang="en-US" sz="3200" b="1" dirty="0">
+              <a:solidFill>
+                <a:schemeClr val="bg1">
+                  <a:lumMod val="65000"/>
+                </a:schemeClr>
+              </a:solidFill>
+            </a:endParaRPr>
+          </a:p>
+        </p:txBody>
+      </p:sp>
+      <p:sp>
+        <p:nvSpPr>
+          <p:cNvPr id="16" name="TextBox 15"/>
+          <p:cNvSpPr txBox="1"/>
+          <p:nvPr/>
+        </p:nvSpPr>
+        <p:spPr>
+          <a:xfrm>
+            <a:off x="362946" y="1964398"/>
+            <a:ext cx="8511327" cy="1046440"/>
+          </a:xfrm>
+          <a:prstGeom prst="rect">
+            <a:avLst/>
+          </a:prstGeom>
+          <a:noFill/>
+        </p:spPr>
+        <p:txBody>
+          <a:bodyPr wrap="none" rtlCol="0">
+            <a:spAutoFit/>
+          </a:bodyPr>
+          <a:lstStyle/>
+          <a:p>
+            <a:r>
+              <a:rPr lang="en-US" sz="3000" i="1" dirty="0" smtClean="0"/>
+              <a:t>“quick </a:t>
+            </a:r>
+            <a:r>
+              <a:rPr lang="en-US" sz="3000" i="1" dirty="0"/>
+              <a:t>&amp; dirty, to make nested </a:t>
+            </a:r>
+            <a:r>
+              <a:rPr lang="en-US" sz="3000" i="1" dirty="0" smtClean="0"/>
+              <a:t>mapped </a:t>
+            </a:r>
+            <a:r>
+              <a:rPr lang="en-US" sz="3000" i="1" dirty="0"/>
+              <a:t>p-sets work:” </a:t>
+            </a:r>
+            <a:endParaRPr lang="en-US" sz="3000" i="1" dirty="0" smtClean="0"/>
+          </a:p>
+          <a:p>
+            <a:r>
+              <a:rPr lang="en-US" sz="3000" dirty="0" smtClean="0"/>
+              <a:t> </a:t>
+            </a:r>
+            <a:r>
+              <a:rPr lang="en-US" sz="3000" dirty="0"/>
+              <a:t>[</a:t>
+            </a:r>
+            <a:r>
+              <a:rPr lang="en-US" sz="3000" dirty="0" smtClean="0"/>
+              <a:t>from Ant</a:t>
+            </a:r>
+            <a:r>
+              <a:rPr lang="en-US" sz="3000" dirty="0"/>
+              <a:t>]</a:t>
+            </a:r>
+            <a:r>
+              <a:rPr lang="en-US" sz="3200" dirty="0"/>
+              <a:t> </a:t>
+            </a:r>
+            <a:endParaRPr lang="en-US" sz="3200" dirty="0"/>
+          </a:p>
+        </p:txBody>
+      </p:sp>
+      <p:sp>
+        <p:nvSpPr>
+          <p:cNvPr id="17" name="TextBox 16"/>
+          <p:cNvSpPr txBox="1"/>
+          <p:nvPr/>
+        </p:nvSpPr>
+        <p:spPr>
+          <a:xfrm>
+            <a:off x="339106" y="3092084"/>
+            <a:ext cx="3465011" cy="584776"/>
+          </a:xfrm>
+          <a:prstGeom prst="rect">
+            <a:avLst/>
+          </a:prstGeom>
+          <a:noFill/>
+        </p:spPr>
+        <p:txBody>
+          <a:bodyPr wrap="none" rtlCol="0">
+            <a:spAutoFit/>
+          </a:bodyPr>
+          <a:lstStyle/>
+          <a:p>
+            <a:r>
+              <a:rPr lang="en-US" sz="3200" b="1" dirty="0" smtClean="0">
+                <a:solidFill>
+                  <a:schemeClr val="bg1">
+                    <a:lumMod val="65000"/>
+                  </a:schemeClr>
+                </a:solidFill>
+              </a:rPr>
+              <a:t>Requirement Debt:</a:t>
+            </a:r>
+            <a:endParaRPr lang="en-US" sz="3200" b="1" dirty="0">
+              <a:solidFill>
+                <a:schemeClr val="bg1">
+                  <a:lumMod val="65000"/>
+                </a:schemeClr>
+              </a:solidFill>
+            </a:endParaRPr>
+          </a:p>
+        </p:txBody>
+      </p:sp>
+      <p:sp>
+        <p:nvSpPr>
+          <p:cNvPr id="18" name="TextBox 17"/>
+          <p:cNvSpPr txBox="1"/>
+          <p:nvPr/>
+        </p:nvSpPr>
+        <p:spPr>
+          <a:xfrm>
+            <a:off x="362884" y="4332870"/>
+            <a:ext cx="2346516" cy="584776"/>
+          </a:xfrm>
+          <a:prstGeom prst="rect">
+            <a:avLst/>
+          </a:prstGeom>
+          <a:noFill/>
+        </p:spPr>
+        <p:txBody>
+          <a:bodyPr wrap="none" rtlCol="0">
+            <a:spAutoFit/>
+          </a:bodyPr>
+          <a:lstStyle/>
+          <a:p>
+            <a:r>
+              <a:rPr lang="en-US" sz="3200" b="1" dirty="0" smtClean="0">
+                <a:solidFill>
+                  <a:schemeClr val="bg1">
+                    <a:lumMod val="65000"/>
+                  </a:schemeClr>
+                </a:solidFill>
+              </a:rPr>
+              <a:t>Defect Debt:</a:t>
+            </a:r>
+            <a:endParaRPr lang="en-US" sz="3200" b="1" dirty="0">
+              <a:solidFill>
+                <a:schemeClr val="bg1">
+                  <a:lumMod val="65000"/>
+                </a:schemeClr>
+              </a:solidFill>
+            </a:endParaRPr>
+          </a:p>
+        </p:txBody>
+      </p:sp>
+      <p:sp>
+        <p:nvSpPr>
+          <p:cNvPr id="19" name="TextBox 18"/>
+          <p:cNvSpPr txBox="1"/>
+          <p:nvPr/>
+        </p:nvSpPr>
+        <p:spPr>
+          <a:xfrm>
+            <a:off x="362884" y="4940169"/>
+            <a:ext cx="6258168" cy="553998"/>
+          </a:xfrm>
+          <a:prstGeom prst="rect">
+            <a:avLst/>
+          </a:prstGeom>
+          <a:noFill/>
+        </p:spPr>
+        <p:txBody>
+          <a:bodyPr wrap="none" rtlCol="0">
+            <a:spAutoFit/>
+          </a:bodyPr>
+          <a:lstStyle/>
+          <a:p>
+            <a:r>
+              <a:rPr lang="en-US" sz="3000" i="1" dirty="0" smtClean="0"/>
+              <a:t>“Bug </a:t>
+            </a:r>
+            <a:r>
+              <a:rPr lang="en-US" sz="3000" i="1" dirty="0"/>
+              <a:t>in above method” - [from </a:t>
+            </a:r>
+            <a:r>
+              <a:rPr lang="en-US" sz="3000" i="1" dirty="0" err="1" smtClean="0"/>
+              <a:t>Jmeter</a:t>
+            </a:r>
+            <a:r>
+              <a:rPr lang="en-US" sz="3000" i="1" dirty="0"/>
+              <a:t>]</a:t>
+            </a:r>
+            <a:endParaRPr lang="en-US" sz="3000" dirty="0"/>
+          </a:p>
+        </p:txBody>
+      </p:sp>
+      <p:sp>
+        <p:nvSpPr>
+          <p:cNvPr id="20" name="TextBox 19"/>
+          <p:cNvSpPr txBox="1"/>
+          <p:nvPr/>
+        </p:nvSpPr>
+        <p:spPr>
+          <a:xfrm>
+            <a:off x="339106" y="3680806"/>
+            <a:ext cx="8569686" cy="553998"/>
+          </a:xfrm>
+          <a:prstGeom prst="rect">
+            <a:avLst/>
+          </a:prstGeom>
+          <a:noFill/>
+        </p:spPr>
+        <p:txBody>
+          <a:bodyPr wrap="none" rtlCol="0">
+            <a:spAutoFit/>
+          </a:bodyPr>
+          <a:lstStyle/>
+          <a:p>
+            <a:r>
+              <a:rPr lang="en-US" sz="3000" i="1" dirty="0" smtClean="0"/>
+              <a:t>“TODO: </a:t>
+            </a:r>
+            <a:r>
+              <a:rPr lang="en-US" sz="3000" i="1" dirty="0"/>
+              <a:t>no methods yet for </a:t>
+            </a:r>
+            <a:r>
+              <a:rPr lang="en-US" sz="3000" i="1" dirty="0" err="1"/>
+              <a:t>getClassname</a:t>
+            </a:r>
+            <a:r>
+              <a:rPr lang="en-US" sz="3000" i="1" dirty="0" smtClean="0"/>
+              <a:t>” </a:t>
+            </a:r>
+            <a:r>
+              <a:rPr lang="en-US" sz="3000" i="1" dirty="0"/>
+              <a:t>[from </a:t>
+            </a:r>
+            <a:r>
+              <a:rPr lang="en-US" sz="3000" i="1" dirty="0" smtClean="0"/>
+              <a:t>Ant</a:t>
+            </a:r>
+            <a:r>
+              <a:rPr lang="en-US" sz="3000" i="1" dirty="0"/>
+              <a:t>]</a:t>
+            </a:r>
+            <a:endParaRPr lang="en-US" sz="3000" dirty="0"/>
+          </a:p>
+        </p:txBody>
+      </p:sp>
+      <p:grpSp>
+        <p:nvGrpSpPr>
+          <p:cNvPr id="22" name="Group 21"/>
+          <p:cNvGrpSpPr/>
+          <p:nvPr/>
+        </p:nvGrpSpPr>
+        <p:grpSpPr>
+          <a:xfrm>
+            <a:off x="495865" y="1143000"/>
+            <a:ext cx="8276967" cy="4653239"/>
+            <a:chOff x="225919" y="1287489"/>
+            <a:chExt cx="8276967" cy="4653239"/>
+          </a:xfrm>
+        </p:grpSpPr>
+        <p:grpSp>
+          <p:nvGrpSpPr>
+            <p:cNvPr id="24" name="Group 23"/>
+            <p:cNvGrpSpPr/>
+            <p:nvPr/>
+          </p:nvGrpSpPr>
+          <p:grpSpPr>
+            <a:xfrm>
+              <a:off x="546828" y="1287489"/>
+              <a:ext cx="7956058" cy="4653239"/>
+              <a:chOff x="1463376" y="3288643"/>
+              <a:chExt cx="6385453" cy="3633266"/>
+            </a:xfrm>
+          </p:grpSpPr>
+          <p:grpSp>
+            <p:nvGrpSpPr>
+              <p:cNvPr id="26" name="Group 25"/>
+              <p:cNvGrpSpPr/>
+              <p:nvPr/>
+            </p:nvGrpSpPr>
+            <p:grpSpPr>
+              <a:xfrm>
+                <a:off x="1463376" y="3288643"/>
+                <a:ext cx="6385453" cy="3633266"/>
+                <a:chOff x="269127" y="1219200"/>
+                <a:chExt cx="8487418" cy="4592222"/>
+              </a:xfrm>
+            </p:grpSpPr>
+            <p:pic>
+              <p:nvPicPr>
+                <p:cNvPr id="44" name="Picture 43" descr="technical_debt_distribution.pdf"/>
+                <p:cNvPicPr>
+                  <a:picLocks noChangeAspect="1"/>
+                </p:cNvPicPr>
+                <p:nvPr/>
+              </p:nvPicPr>
+              <p:blipFill>
+                <a:blip r:embed="rId3">
+                  <a:extLst>
+                    <a:ext uri="{28A0092B-C50C-407E-A947-70E740481C1C}">
+                      <a14:useLocalDpi xmlns:a14="http://schemas.microsoft.com/office/drawing/2010/main" val="0"/>
+                    </a:ext>
+                  </a:extLst>
+                </a:blip>
+                <a:stretch>
+                  <a:fillRect/>
+                </a:stretch>
+              </p:blipFill>
+              <p:spPr>
+                <a:xfrm>
+                  <a:off x="269127" y="1219200"/>
+                  <a:ext cx="7838315" cy="4592222"/>
+                </a:xfrm>
+                <a:prstGeom prst="rect">
+                  <a:avLst/>
+                </a:prstGeom>
+              </p:spPr>
+            </p:pic>
+            <p:pic>
+              <p:nvPicPr>
+                <p:cNvPr id="45" name="Picture 44" descr="technical_debt_distribution.pdf"/>
+                <p:cNvPicPr>
+                  <a:picLocks noChangeAspect="1"/>
+                </p:cNvPicPr>
+                <p:nvPr/>
+              </p:nvPicPr>
+              <p:blipFill rotWithShape="1">
+                <a:blip r:embed="rId3">
+                  <a:extLst>
+                    <a:ext uri="{28A0092B-C50C-407E-A947-70E740481C1C}">
+                      <a14:useLocalDpi xmlns:a14="http://schemas.microsoft.com/office/drawing/2010/main" val="0"/>
+                    </a:ext>
+                  </a:extLst>
+                </a:blip>
+                <a:srcRect l="72958" t="16854" r="6806" b="69927"/>
+                <a:stretch/>
+              </p:blipFill>
+              <p:spPr>
+                <a:xfrm>
+                  <a:off x="5855842" y="1873778"/>
+                  <a:ext cx="2900703" cy="1110234"/>
+                </a:xfrm>
+                <a:prstGeom prst="rect">
+                  <a:avLst/>
+                </a:prstGeom>
+              </p:spPr>
+            </p:pic>
+          </p:grpSp>
+          <p:grpSp>
+            <p:nvGrpSpPr>
+              <p:cNvPr id="31" name="Group 30"/>
+              <p:cNvGrpSpPr/>
+              <p:nvPr/>
+            </p:nvGrpSpPr>
+            <p:grpSpPr>
+              <a:xfrm>
+                <a:off x="2078337" y="6482709"/>
+                <a:ext cx="5011468" cy="421502"/>
+                <a:chOff x="313210" y="4021395"/>
+                <a:chExt cx="5011468" cy="421502"/>
+              </a:xfrm>
+            </p:grpSpPr>
+            <p:pic>
+              <p:nvPicPr>
+                <p:cNvPr id="39" name="Picture 38" descr="technical_debt_distribution.pdf"/>
+                <p:cNvPicPr>
+                  <a:picLocks noChangeAspect="1"/>
+                </p:cNvPicPr>
+                <p:nvPr/>
+              </p:nvPicPr>
+              <p:blipFill rotWithShape="1">
+                <a:blip r:embed="rId3">
+                  <a:extLst>
+                    <a:ext uri="{28A0092B-C50C-407E-A947-70E740481C1C}">
+                      <a14:useLocalDpi xmlns:a14="http://schemas.microsoft.com/office/drawing/2010/main" val="0"/>
+                    </a:ext>
+                  </a:extLst>
+                </a:blip>
+                <a:srcRect l="13841" t="88838" r="80825" b="5667"/>
+                <a:stretch/>
+              </p:blipFill>
+              <p:spPr>
+                <a:xfrm>
+                  <a:off x="313210" y="4021395"/>
+                  <a:ext cx="654980" cy="395311"/>
+                </a:xfrm>
+                <a:prstGeom prst="rect">
+                  <a:avLst/>
+                </a:prstGeom>
+              </p:spPr>
+            </p:pic>
+            <p:pic>
+              <p:nvPicPr>
+                <p:cNvPr id="40" name="Picture 39" descr="technical_debt_distribution.pdf"/>
+                <p:cNvPicPr>
+                  <a:picLocks noChangeAspect="1"/>
+                </p:cNvPicPr>
+                <p:nvPr/>
+              </p:nvPicPr>
+              <p:blipFill rotWithShape="1">
+                <a:blip r:embed="rId3">
+                  <a:extLst>
+                    <a:ext uri="{28A0092B-C50C-407E-A947-70E740481C1C}">
+                      <a14:useLocalDpi xmlns:a14="http://schemas.microsoft.com/office/drawing/2010/main" val="0"/>
+                    </a:ext>
+                  </a:extLst>
+                </a:blip>
+                <a:srcRect l="31092" t="88838" r="62744" b="5667"/>
+                <a:stretch/>
+              </p:blipFill>
+              <p:spPr>
+                <a:xfrm>
+                  <a:off x="1338239" y="4021395"/>
+                  <a:ext cx="756918" cy="395311"/>
+                </a:xfrm>
+                <a:prstGeom prst="rect">
+                  <a:avLst/>
+                </a:prstGeom>
+              </p:spPr>
+            </p:pic>
+            <p:pic>
+              <p:nvPicPr>
+                <p:cNvPr id="41" name="Picture 40" descr="technical_debt_distribution.pdf"/>
+                <p:cNvPicPr>
+                  <a:picLocks noChangeAspect="1"/>
+                </p:cNvPicPr>
+                <p:nvPr/>
+              </p:nvPicPr>
+              <p:blipFill rotWithShape="1">
+                <a:blip r:embed="rId3">
+                  <a:extLst>
+                    <a:ext uri="{28A0092B-C50C-407E-A947-70E740481C1C}">
+                      <a14:useLocalDpi xmlns:a14="http://schemas.microsoft.com/office/drawing/2010/main" val="0"/>
+                    </a:ext>
+                  </a:extLst>
+                </a:blip>
+                <a:srcRect l="47729" t="88838" r="44738" b="5667"/>
+                <a:stretch/>
+              </p:blipFill>
+              <p:spPr>
+                <a:xfrm>
+                  <a:off x="2263362" y="4047586"/>
+                  <a:ext cx="925123" cy="395311"/>
+                </a:xfrm>
+                <a:prstGeom prst="rect">
+                  <a:avLst/>
+                </a:prstGeom>
+              </p:spPr>
+            </p:pic>
+            <p:pic>
+              <p:nvPicPr>
+                <p:cNvPr id="42" name="Picture 41" descr="technical_debt_distribution.pdf"/>
+                <p:cNvPicPr>
+                  <a:picLocks noChangeAspect="1"/>
+                </p:cNvPicPr>
+                <p:nvPr/>
+              </p:nvPicPr>
+              <p:blipFill rotWithShape="1">
+                <a:blip r:embed="rId3">
+                  <a:extLst>
+                    <a:ext uri="{28A0092B-C50C-407E-A947-70E740481C1C}">
+                      <a14:useLocalDpi xmlns:a14="http://schemas.microsoft.com/office/drawing/2010/main" val="0"/>
+                    </a:ext>
+                  </a:extLst>
+                </a:blip>
+                <a:srcRect l="64849" t="88838" r="26659" b="5667"/>
+                <a:stretch/>
+              </p:blipFill>
+              <p:spPr>
+                <a:xfrm>
+                  <a:off x="3255767" y="4047586"/>
+                  <a:ext cx="1042866" cy="395311"/>
+                </a:xfrm>
+                <a:prstGeom prst="rect">
+                  <a:avLst/>
+                </a:prstGeom>
+              </p:spPr>
+            </p:pic>
+            <p:pic>
+              <p:nvPicPr>
+                <p:cNvPr id="43" name="Picture 42" descr="technical_debt_distribution.pdf"/>
+                <p:cNvPicPr>
+                  <a:picLocks noChangeAspect="1"/>
+                </p:cNvPicPr>
+                <p:nvPr/>
+              </p:nvPicPr>
+              <p:blipFill rotWithShape="1">
+                <a:blip r:embed="rId3">
+                  <a:extLst>
+                    <a:ext uri="{28A0092B-C50C-407E-A947-70E740481C1C}">
+                      <a14:useLocalDpi xmlns:a14="http://schemas.microsoft.com/office/drawing/2010/main" val="0"/>
+                    </a:ext>
+                  </a:extLst>
+                </a:blip>
+                <a:srcRect l="82585" t="88838" r="9813" b="6499"/>
+                <a:stretch/>
+              </p:blipFill>
+              <p:spPr>
+                <a:xfrm>
+                  <a:off x="4391145" y="4021395"/>
+                  <a:ext cx="933533" cy="335428"/>
+                </a:xfrm>
+                <a:prstGeom prst="rect">
+                  <a:avLst/>
+                </a:prstGeom>
+              </p:spPr>
+            </p:pic>
+          </p:grpSp>
+        </p:grpSp>
+        <p:pic>
+          <p:nvPicPr>
+            <p:cNvPr id="25" name="Picture 24" descr="technical_debt_distribution.pdf"/>
+            <p:cNvPicPr>
+              <a:picLocks noChangeAspect="1"/>
+            </p:cNvPicPr>
+            <p:nvPr/>
+          </p:nvPicPr>
+          <p:blipFill rotWithShape="1">
+            <a:blip r:embed="rId3">
+              <a:extLst>
+                <a:ext uri="{28A0092B-C50C-407E-A947-70E740481C1C}">
+                  <a14:useLocalDpi xmlns:a14="http://schemas.microsoft.com/office/drawing/2010/main" val="0"/>
+                </a:ext>
+              </a:extLst>
+            </a:blip>
+            <a:srcRect t="40352" r="97711" b="43019"/>
+            <a:stretch/>
+          </p:blipFill>
+          <p:spPr>
+            <a:xfrm>
+              <a:off x="225919" y="2380268"/>
+              <a:ext cx="462562" cy="2127949"/>
+            </a:xfrm>
+            <a:prstGeom prst="rect">
+              <a:avLst/>
+            </a:prstGeom>
+          </p:spPr>
+        </p:pic>
+      </p:grpSp>
+    </p:spTree>
+    <p:extLst>
+      <p:ext uri="{BB962C8B-B14F-4D97-AF65-F5344CB8AC3E}">
+        <p14:creationId xmlns:p14="http://schemas.microsoft.com/office/powerpoint/2010/main" val="2063251114"/>
       </p:ext>
     </p:extLst>
   </p:cSld>
@@ -9071,7 +9599,7 @@
                             </p:stCondLst>
                             <p:childTnLst>
                               <p:par>
-                                <p:cTn id="5" presetID="1" presetClass="entr" presetSubtype="0" fill="hold" nodeType="clickEffect">
+                                <p:cTn id="5" presetID="1" presetClass="exit" presetSubtype="0" fill="hold" nodeType="clickEffect">
                                   <p:stCondLst>
                                     <p:cond delay="0"/>
                                   </p:stCondLst>
@@ -9084,7 +9612,214 @@
                                           </p:stCondLst>
                                         </p:cTn>
                                         <p:tgtEl>
-                                          <p:spTgt spid="38"/>
+                                          <p:spTgt spid="22"/>
+                                        </p:tgtEl>
+                                        <p:attrNameLst>
+                                          <p:attrName>style.visibility</p:attrName>
+                                        </p:attrNameLst>
+                                      </p:cBhvr>
+                                      <p:to>
+                                        <p:strVal val="hidden"/>
+                                      </p:to>
+                                    </p:set>
+                                  </p:childTnLst>
+                                </p:cTn>
+                              </p:par>
+                            </p:childTnLst>
+                          </p:cTn>
+                        </p:par>
+                        <p:par>
+                          <p:cTn id="7" fill="hold">
+                            <p:stCondLst>
+                              <p:cond delay="0"/>
+                            </p:stCondLst>
+                            <p:childTnLst>
+                              <p:par>
+                                <p:cTn id="8" presetID="1" presetClass="entr" presetSubtype="0" fill="hold" grpId="0" nodeType="afterEffect">
+                                  <p:stCondLst>
+                                    <p:cond delay="0"/>
+                                  </p:stCondLst>
+                                  <p:childTnLst>
+                                    <p:set>
+                                      <p:cBhvr>
+                                        <p:cTn id="9" dur="1" fill="hold">
+                                          <p:stCondLst>
+                                            <p:cond delay="0"/>
+                                          </p:stCondLst>
+                                        </p:cTn>
+                                        <p:tgtEl>
+                                          <p:spTgt spid="15"/>
+                                        </p:tgtEl>
+                                        <p:attrNameLst>
+                                          <p:attrName>style.visibility</p:attrName>
+                                        </p:attrNameLst>
+                                      </p:cBhvr>
+                                      <p:to>
+                                        <p:strVal val="visible"/>
+                                      </p:to>
+                                    </p:set>
+                                  </p:childTnLst>
+                                </p:cTn>
+                              </p:par>
+                              <p:par>
+                                <p:cTn id="10" presetID="1" presetClass="entr" presetSubtype="0" fill="hold" grpId="0" nodeType="withEffect">
+                                  <p:stCondLst>
+                                    <p:cond delay="0"/>
+                                  </p:stCondLst>
+                                  <p:childTnLst>
+                                    <p:set>
+                                      <p:cBhvr>
+                                        <p:cTn id="11" dur="1" fill="hold">
+                                          <p:stCondLst>
+                                            <p:cond delay="0"/>
+                                          </p:stCondLst>
+                                        </p:cTn>
+                                        <p:tgtEl>
+                                          <p:spTgt spid="16"/>
+                                        </p:tgtEl>
+                                        <p:attrNameLst>
+                                          <p:attrName>style.visibility</p:attrName>
+                                        </p:attrNameLst>
+                                      </p:cBhvr>
+                                      <p:to>
+                                        <p:strVal val="visible"/>
+                                      </p:to>
+                                    </p:set>
+                                  </p:childTnLst>
+                                </p:cTn>
+                              </p:par>
+                            </p:childTnLst>
+                          </p:cTn>
+                        </p:par>
+                      </p:childTnLst>
+                    </p:cTn>
+                  </p:par>
+                  <p:par>
+                    <p:cTn id="12" fill="hold">
+                      <p:stCondLst>
+                        <p:cond delay="indefinite"/>
+                      </p:stCondLst>
+                      <p:childTnLst>
+                        <p:par>
+                          <p:cTn id="13" fill="hold">
+                            <p:stCondLst>
+                              <p:cond delay="0"/>
+                            </p:stCondLst>
+                            <p:childTnLst>
+                              <p:par>
+                                <p:cTn id="14" presetID="1" presetClass="entr" presetSubtype="0" fill="hold" grpId="0" nodeType="clickEffect">
+                                  <p:stCondLst>
+                                    <p:cond delay="0"/>
+                                  </p:stCondLst>
+                                  <p:childTnLst>
+                                    <p:set>
+                                      <p:cBhvr>
+                                        <p:cTn id="15" dur="1" fill="hold">
+                                          <p:stCondLst>
+                                            <p:cond delay="0"/>
+                                          </p:stCondLst>
+                                        </p:cTn>
+                                        <p:tgtEl>
+                                          <p:spTgt spid="17"/>
+                                        </p:tgtEl>
+                                        <p:attrNameLst>
+                                          <p:attrName>style.visibility</p:attrName>
+                                        </p:attrNameLst>
+                                      </p:cBhvr>
+                                      <p:to>
+                                        <p:strVal val="visible"/>
+                                      </p:to>
+                                    </p:set>
+                                  </p:childTnLst>
+                                </p:cTn>
+                              </p:par>
+                              <p:par>
+                                <p:cTn id="16" presetID="1" presetClass="entr" presetSubtype="0" fill="hold" grpId="0" nodeType="withEffect">
+                                  <p:stCondLst>
+                                    <p:cond delay="0"/>
+                                  </p:stCondLst>
+                                  <p:childTnLst>
+                                    <p:set>
+                                      <p:cBhvr>
+                                        <p:cTn id="17" dur="1" fill="hold">
+                                          <p:stCondLst>
+                                            <p:cond delay="0"/>
+                                          </p:stCondLst>
+                                        </p:cTn>
+                                        <p:tgtEl>
+                                          <p:spTgt spid="20"/>
+                                        </p:tgtEl>
+                                        <p:attrNameLst>
+                                          <p:attrName>style.visibility</p:attrName>
+                                        </p:attrNameLst>
+                                      </p:cBhvr>
+                                      <p:to>
+                                        <p:strVal val="visible"/>
+                                      </p:to>
+                                    </p:set>
+                                  </p:childTnLst>
+                                </p:cTn>
+                              </p:par>
+                            </p:childTnLst>
+                          </p:cTn>
+                        </p:par>
+                      </p:childTnLst>
+                    </p:cTn>
+                  </p:par>
+                  <p:par>
+                    <p:cTn id="18" fill="hold">
+                      <p:stCondLst>
+                        <p:cond delay="indefinite"/>
+                      </p:stCondLst>
+                      <p:childTnLst>
+                        <p:par>
+                          <p:cTn id="19" fill="hold">
+                            <p:stCondLst>
+                              <p:cond delay="0"/>
+                            </p:stCondLst>
+                            <p:childTnLst>
+                              <p:par>
+                                <p:cTn id="20" presetID="1" presetClass="entr" presetSubtype="0" fill="hold" grpId="0" nodeType="clickEffect">
+                                  <p:stCondLst>
+                                    <p:cond delay="0"/>
+                                  </p:stCondLst>
+                                  <p:childTnLst>
+                                    <p:set>
+                                      <p:cBhvr>
+                                        <p:cTn id="21" dur="1" fill="hold">
+                                          <p:stCondLst>
+                                            <p:cond delay="0"/>
+                                          </p:stCondLst>
+                                        </p:cTn>
+                                        <p:tgtEl>
+                                          <p:spTgt spid="18"/>
+                                        </p:tgtEl>
+                                        <p:attrNameLst>
+                                          <p:attrName>style.visibility</p:attrName>
+                                        </p:attrNameLst>
+                                      </p:cBhvr>
+                                      <p:to>
+                                        <p:strVal val="visible"/>
+                                      </p:to>
+                                    </p:set>
+                                  </p:childTnLst>
+                                </p:cTn>
+                              </p:par>
+                              <p:par>
+                                <p:cTn id="22" presetID="1" presetClass="entr" presetSubtype="0" fill="hold" grpId="0" nodeType="withEffect">
+                                  <p:stCondLst>
+                                    <p:cond delay="0"/>
+                                  </p:stCondLst>
+                                  <p:childTnLst>
+                                    <p:set>
+                                      <p:cBhvr>
+                                        <p:cTn id="23" dur="1" fill="hold">
+                                          <p:stCondLst>
+                                            <p:cond delay="0"/>
+                                          </p:stCondLst>
+                                        </p:cTn>
+                                        <p:tgtEl>
+                                          <p:spTgt spid="19"/>
                                         </p:tgtEl>
                                         <p:attrNameLst>
                                           <p:attrName>style.visibility</p:attrName>
@@ -9124,11 +9859,19 @@
         </p:cTn>
       </p:par>
     </p:tnLst>
+    <p:bldLst>
+      <p:bldP spid="15" grpId="0"/>
+      <p:bldP spid="16" grpId="0"/>
+      <p:bldP spid="17" grpId="0"/>
+      <p:bldP spid="18" grpId="0"/>
+      <p:bldP spid="19" grpId="0"/>
+      <p:bldP spid="20" grpId="0"/>
+    </p:bldLst>
   </p:timing>
 </p:sld>
 </file>
 
-<file path=ppt/slides/slide8.xml><?xml version="1.0" encoding="utf-8"?>
+<file path=ppt/slides/slide9.xml><?xml version="1.0" encoding="utf-8"?>
 <p:sld xmlns:a="http://schemas.openxmlformats.org/drawingml/2006/main" xmlns:r="http://schemas.openxmlformats.org/officeDocument/2006/relationships" xmlns:p="http://schemas.openxmlformats.org/presentationml/2006/main">
   <p:cSld>
     <p:spTree>
@@ -9197,7 +9940,7 @@
         <p:spPr>
           <a:xfrm>
             <a:off x="609601" y="1524000"/>
-            <a:ext cx="8229600" cy="523220"/>
+            <a:ext cx="8229600" cy="646331"/>
           </a:xfrm>
           <a:prstGeom prst="rect">
             <a:avLst/>
@@ -9211,26 +9954,30 @@
           <a:lstStyle/>
           <a:p>
             <a:r>
+              <a:rPr lang="en-US" sz="3600" dirty="0" smtClean="0"/>
+              <a:t>1.</a:t>
+            </a:r>
+            <a:r>
               <a:rPr lang="en-US" sz="2800" dirty="0" smtClean="0"/>
-              <a:t>1. </a:t>
-            </a:r>
-            <a:r>
-              <a:rPr lang="en-US" sz="2800" dirty="0" smtClean="0"/>
+              <a:t> </a:t>
+            </a:r>
+            <a:r>
+              <a:rPr lang="en-US" sz="3600" dirty="0" smtClean="0"/>
               <a:t>We found </a:t>
             </a:r>
             <a:r>
-              <a:rPr lang="en-US" sz="2800" b="1" dirty="0" smtClean="0"/>
+              <a:rPr lang="en-US" sz="3600" b="1" dirty="0" smtClean="0"/>
               <a:t>5 types</a:t>
             </a:r>
             <a:r>
-              <a:rPr lang="en-US" sz="2800" dirty="0" smtClean="0"/>
+              <a:rPr lang="en-US" sz="3600" dirty="0" smtClean="0"/>
               <a:t> of self-admitted TD</a:t>
             </a:r>
             <a:r>
-              <a:rPr lang="en-US" sz="2800" b="1" dirty="0" smtClean="0"/>
+              <a:rPr lang="en-US" sz="3600" b="1" dirty="0" smtClean="0"/>
               <a:t>.</a:t>
             </a:r>
-            <a:endParaRPr lang="en-US" sz="2800" dirty="0"/>
+            <a:endParaRPr lang="en-US" sz="3600" dirty="0"/>
           </a:p>
         </p:txBody>
       </p:sp>
@@ -9242,8 +9989,8 @@
         </p:nvSpPr>
         <p:spPr>
           <a:xfrm>
-            <a:off x="609601" y="2594578"/>
-            <a:ext cx="8229600" cy="954107"/>
+            <a:off x="609601" y="2661866"/>
+            <a:ext cx="8229600" cy="1200329"/>
           </a:xfrm>
           <a:prstGeom prst="rect">
             <a:avLst/>
@@ -9257,30 +10004,34 @@
           <a:lstStyle/>
           <a:p>
             <a:r>
+              <a:rPr lang="en-US" sz="3600" dirty="0" smtClean="0"/>
+              <a:t>2.</a:t>
+            </a:r>
+            <a:r>
               <a:rPr lang="en-US" sz="2800" dirty="0" smtClean="0"/>
-              <a:t>2. </a:t>
-            </a:r>
-            <a:r>
-              <a:rPr lang="en-US" sz="2800" b="1" dirty="0" smtClean="0"/>
+              <a:t> </a:t>
+            </a:r>
+            <a:r>
+              <a:rPr lang="en-US" sz="3600" b="1" dirty="0" smtClean="0"/>
               <a:t>3% </a:t>
             </a:r>
             <a:r>
-              <a:rPr lang="en-US" sz="2800" dirty="0" smtClean="0"/>
+              <a:rPr lang="en-US" sz="3600" dirty="0" smtClean="0"/>
               <a:t>~</a:t>
             </a:r>
             <a:r>
-              <a:rPr lang="en-US" sz="2800" b="1" dirty="0" smtClean="0"/>
+              <a:rPr lang="en-US" sz="3600" b="1" dirty="0" smtClean="0"/>
               <a:t> 16% </a:t>
             </a:r>
             <a:r>
-              <a:rPr lang="en-US" sz="2800" dirty="0" smtClean="0"/>
+              <a:rPr lang="en-US" sz="3600" dirty="0" smtClean="0"/>
               <a:t>of the comments contains some type of technical debt</a:t>
             </a:r>
             <a:r>
-              <a:rPr lang="en-US" sz="2800" b="1" dirty="0" smtClean="0"/>
+              <a:rPr lang="en-US" sz="3600" b="1" dirty="0" smtClean="0"/>
               <a:t>.</a:t>
             </a:r>
-            <a:endParaRPr lang="en-US" sz="2800" dirty="0"/>
+            <a:endParaRPr lang="en-US" sz="3600" dirty="0"/>
           </a:p>
         </p:txBody>
       </p:sp>
@@ -9292,8 +10043,8 @@
         </p:nvSpPr>
         <p:spPr>
           <a:xfrm>
-            <a:off x="609600" y="3903653"/>
-            <a:ext cx="8229600" cy="954107"/>
+            <a:off x="609600" y="4164394"/>
+            <a:ext cx="8229600" cy="1200329"/>
           </a:xfrm>
           <a:prstGeom prst="rect">
             <a:avLst/>
@@ -9307,34 +10058,34 @@
           <a:lstStyle/>
           <a:p>
             <a:r>
-              <a:rPr lang="en-US" sz="2800" dirty="0"/>
+              <a:rPr lang="en-US" sz="3600" dirty="0"/>
               <a:t>3</a:t>
             </a:r>
             <a:r>
-              <a:rPr lang="en-US" sz="2800" dirty="0" smtClean="0"/>
+              <a:rPr lang="en-US" sz="3600" dirty="0" smtClean="0"/>
               <a:t>. </a:t>
             </a:r>
             <a:r>
-              <a:rPr lang="en-US" sz="2800" b="1" dirty="0"/>
+              <a:rPr lang="en-US" sz="3600" b="1" dirty="0"/>
               <a:t>Design</a:t>
             </a:r>
             <a:r>
-              <a:rPr lang="en-US" sz="2800" dirty="0"/>
+              <a:rPr lang="en-US" sz="3600" dirty="0"/>
               <a:t> and </a:t>
             </a:r>
             <a:r>
-              <a:rPr lang="en-US" sz="2800" b="1" dirty="0"/>
+              <a:rPr lang="en-US" sz="3600" b="1" dirty="0"/>
               <a:t>Requirement</a:t>
             </a:r>
             <a:r>
-              <a:rPr lang="en-US" sz="2800" dirty="0"/>
+              <a:rPr lang="en-US" sz="3600" dirty="0"/>
               <a:t> debt are the most common </a:t>
             </a:r>
             <a:r>
-              <a:rPr lang="en-US" sz="2800" dirty="0" smtClean="0"/>
+              <a:rPr lang="en-US" sz="3600" dirty="0" smtClean="0"/>
               <a:t>types of self-admitted TD.</a:t>
             </a:r>
-            <a:endParaRPr lang="en-US" sz="2800" b="1" dirty="0"/>
+            <a:endParaRPr lang="en-US" sz="3600" b="1" dirty="0"/>
           </a:p>
         </p:txBody>
       </p:sp>
@@ -9355,7 +10106,7 @@
           <a:p>
             <a:fld id="{60927F4E-78AB-4E26-A0B2-E6DA284CA8FF}" type="slidenum">
               <a:rPr lang="en-US" smtClean="0"/>
-              <a:t>8</a:t>
+              <a:t>9</a:t>
             </a:fld>
             <a:endParaRPr lang="en-US" dirty="0"/>
           </a:p>

</xml_diff>